<commit_message>
Exp code, raw data and analysis code for Exp 1
</commit_message>
<xml_diff>
--- a/Exp1/code/experiment/Instructions.pptx
+++ b/Exp1/code/experiment/Instructions.pptx
@@ -5,21 +5,24 @@
     <p:sldMasterId id="2147483648" r:id="rId1"/>
   </p:sldMasterIdLst>
   <p:notesMasterIdLst>
-    <p:notesMasterId r:id="rId14"/>
+    <p:notesMasterId r:id="rId17"/>
   </p:notesMasterIdLst>
   <p:sldIdLst>
     <p:sldId id="278" r:id="rId2"/>
-    <p:sldId id="306" r:id="rId3"/>
-    <p:sldId id="257" r:id="rId4"/>
-    <p:sldId id="299" r:id="rId5"/>
-    <p:sldId id="311" r:id="rId6"/>
-    <p:sldId id="312" r:id="rId7"/>
-    <p:sldId id="313" r:id="rId8"/>
-    <p:sldId id="315" r:id="rId9"/>
-    <p:sldId id="314" r:id="rId10"/>
-    <p:sldId id="286" r:id="rId11"/>
-    <p:sldId id="310" r:id="rId12"/>
-    <p:sldId id="288" r:id="rId13"/>
+    <p:sldId id="257" r:id="rId3"/>
+    <p:sldId id="299" r:id="rId4"/>
+    <p:sldId id="311" r:id="rId5"/>
+    <p:sldId id="316" r:id="rId6"/>
+    <p:sldId id="317" r:id="rId7"/>
+    <p:sldId id="324" r:id="rId8"/>
+    <p:sldId id="313" r:id="rId9"/>
+    <p:sldId id="319" r:id="rId10"/>
+    <p:sldId id="320" r:id="rId11"/>
+    <p:sldId id="321" r:id="rId12"/>
+    <p:sldId id="322" r:id="rId13"/>
+    <p:sldId id="323" r:id="rId14"/>
+    <p:sldId id="286" r:id="rId15"/>
+    <p:sldId id="310" r:id="rId16"/>
   </p:sldIdLst>
   <p:sldSz cx="9144000" cy="6858000" type="screen4x3"/>
   <p:notesSz cx="6858000" cy="9144000"/>
@@ -225,7 +228,7 @@
           <a:p>
             <a:fld id="{DE0D2635-BDFF-FC4B-BBDA-1B5475F6174E}" type="datetimeFigureOut">
               <a:rPr lang="en-US" smtClean="0"/>
-              <a:t>11/25/21</a:t>
+              <a:t>11/3/22</a:t>
             </a:fld>
             <a:endParaRPr lang="en-US"/>
           </a:p>
@@ -557,7 +560,7 @@
           <a:p>
             <a:fld id="{3AC6567A-8943-E94A-BBFA-FBE129BB0318}" type="slidenum">
               <a:rPr lang="en-US" smtClean="0"/>
-              <a:t>11</a:t>
+              <a:t>15</a:t>
             </a:fld>
             <a:endParaRPr lang="en-US"/>
           </a:p>
@@ -567,90 +570,6 @@
     <p:extLst>
       <p:ext uri="{BB962C8B-B14F-4D97-AF65-F5344CB8AC3E}">
         <p14:creationId xmlns:p14="http://schemas.microsoft.com/office/powerpoint/2010/main" val="1638460563"/>
-      </p:ext>
-    </p:extLst>
-  </p:cSld>
-  <p:clrMapOvr>
-    <a:masterClrMapping/>
-  </p:clrMapOvr>
-</p:notes>
-</file>
-
-<file path=ppt/notesSlides/notesSlide2.xml><?xml version="1.0" encoding="utf-8"?>
-<p:notes xmlns:a="http://schemas.openxmlformats.org/drawingml/2006/main" xmlns:r="http://schemas.openxmlformats.org/officeDocument/2006/relationships" xmlns:p="http://schemas.openxmlformats.org/presentationml/2006/main">
-  <p:cSld>
-    <p:spTree>
-      <p:nvGrpSpPr>
-        <p:cNvPr id="1" name=""/>
-        <p:cNvGrpSpPr/>
-        <p:nvPr/>
-      </p:nvGrpSpPr>
-      <p:grpSpPr>
-        <a:xfrm>
-          <a:off x="0" y="0"/>
-          <a:ext cx="0" cy="0"/>
-          <a:chOff x="0" y="0"/>
-          <a:chExt cx="0" cy="0"/>
-        </a:xfrm>
-      </p:grpSpPr>
-      <p:sp>
-        <p:nvSpPr>
-          <p:cNvPr id="2" name="Slide Image Placeholder 1"/>
-          <p:cNvSpPr>
-            <a:spLocks noGrp="1" noRot="1" noChangeAspect="1"/>
-          </p:cNvSpPr>
-          <p:nvPr>
-            <p:ph type="sldImg"/>
-          </p:nvPr>
-        </p:nvSpPr>
-        <p:spPr/>
-      </p:sp>
-      <p:sp>
-        <p:nvSpPr>
-          <p:cNvPr id="3" name="Notes Placeholder 2"/>
-          <p:cNvSpPr>
-            <a:spLocks noGrp="1"/>
-          </p:cNvSpPr>
-          <p:nvPr>
-            <p:ph type="body" idx="1"/>
-          </p:nvPr>
-        </p:nvSpPr>
-        <p:spPr/>
-        <p:txBody>
-          <a:bodyPr/>
-          <a:lstStyle/>
-          <a:p>
-            <a:endParaRPr lang="en-US" dirty="0"/>
-          </a:p>
-        </p:txBody>
-      </p:sp>
-      <p:sp>
-        <p:nvSpPr>
-          <p:cNvPr id="4" name="Slide Number Placeholder 3"/>
-          <p:cNvSpPr>
-            <a:spLocks noGrp="1"/>
-          </p:cNvSpPr>
-          <p:nvPr>
-            <p:ph type="sldNum" sz="quarter" idx="5"/>
-          </p:nvPr>
-        </p:nvSpPr>
-        <p:spPr/>
-        <p:txBody>
-          <a:bodyPr/>
-          <a:lstStyle/>
-          <a:p>
-            <a:fld id="{3AC6567A-8943-E94A-BBFA-FBE129BB0318}" type="slidenum">
-              <a:rPr lang="en-US" smtClean="0"/>
-              <a:t>12</a:t>
-            </a:fld>
-            <a:endParaRPr lang="en-US"/>
-          </a:p>
-        </p:txBody>
-      </p:sp>
-    </p:spTree>
-    <p:extLst>
-      <p:ext uri="{BB962C8B-B14F-4D97-AF65-F5344CB8AC3E}">
-        <p14:creationId xmlns:p14="http://schemas.microsoft.com/office/powerpoint/2010/main" val="1959456006"/>
       </p:ext>
     </p:extLst>
   </p:cSld>
@@ -839,7 +758,7 @@
           <a:p>
             <a:fld id="{7212EF1E-2CB8-C54B-94EB-0C51FB85BFE6}" type="datetimeFigureOut">
               <a:rPr lang="en-US" smtClean="0"/>
-              <a:t>11/25/21</a:t>
+              <a:t>11/3/22</a:t>
             </a:fld>
             <a:endParaRPr lang="en-US"/>
           </a:p>
@@ -1007,7 +926,7 @@
           <a:p>
             <a:fld id="{7212EF1E-2CB8-C54B-94EB-0C51FB85BFE6}" type="datetimeFigureOut">
               <a:rPr lang="en-US" smtClean="0"/>
-              <a:t>11/25/21</a:t>
+              <a:t>11/3/22</a:t>
             </a:fld>
             <a:endParaRPr lang="en-US"/>
           </a:p>
@@ -1185,7 +1104,7 @@
           <a:p>
             <a:fld id="{7212EF1E-2CB8-C54B-94EB-0C51FB85BFE6}" type="datetimeFigureOut">
               <a:rPr lang="en-US" smtClean="0"/>
-              <a:t>11/25/21</a:t>
+              <a:t>11/3/22</a:t>
             </a:fld>
             <a:endParaRPr lang="en-US"/>
           </a:p>
@@ -1353,7 +1272,7 @@
           <a:p>
             <a:fld id="{7212EF1E-2CB8-C54B-94EB-0C51FB85BFE6}" type="datetimeFigureOut">
               <a:rPr lang="en-US" smtClean="0"/>
-              <a:t>11/25/21</a:t>
+              <a:t>11/3/22</a:t>
             </a:fld>
             <a:endParaRPr lang="en-US"/>
           </a:p>
@@ -1598,7 +1517,7 @@
           <a:p>
             <a:fld id="{7212EF1E-2CB8-C54B-94EB-0C51FB85BFE6}" type="datetimeFigureOut">
               <a:rPr lang="en-US" smtClean="0"/>
-              <a:t>11/25/21</a:t>
+              <a:t>11/3/22</a:t>
             </a:fld>
             <a:endParaRPr lang="en-US"/>
           </a:p>
@@ -1883,7 +1802,7 @@
           <a:p>
             <a:fld id="{7212EF1E-2CB8-C54B-94EB-0C51FB85BFE6}" type="datetimeFigureOut">
               <a:rPr lang="en-US" smtClean="0"/>
-              <a:t>11/25/21</a:t>
+              <a:t>11/3/22</a:t>
             </a:fld>
             <a:endParaRPr lang="en-US"/>
           </a:p>
@@ -2302,7 +2221,7 @@
           <a:p>
             <a:fld id="{7212EF1E-2CB8-C54B-94EB-0C51FB85BFE6}" type="datetimeFigureOut">
               <a:rPr lang="en-US" smtClean="0"/>
-              <a:t>11/25/21</a:t>
+              <a:t>11/3/22</a:t>
             </a:fld>
             <a:endParaRPr lang="en-US"/>
           </a:p>
@@ -2419,7 +2338,7 @@
           <a:p>
             <a:fld id="{7212EF1E-2CB8-C54B-94EB-0C51FB85BFE6}" type="datetimeFigureOut">
               <a:rPr lang="en-US" smtClean="0"/>
-              <a:t>11/25/21</a:t>
+              <a:t>11/3/22</a:t>
             </a:fld>
             <a:endParaRPr lang="en-US"/>
           </a:p>
@@ -2514,7 +2433,7 @@
           <a:p>
             <a:fld id="{7212EF1E-2CB8-C54B-94EB-0C51FB85BFE6}" type="datetimeFigureOut">
               <a:rPr lang="en-US" smtClean="0"/>
-              <a:t>11/25/21</a:t>
+              <a:t>11/3/22</a:t>
             </a:fld>
             <a:endParaRPr lang="en-US"/>
           </a:p>
@@ -2789,7 +2708,7 @@
           <a:p>
             <a:fld id="{7212EF1E-2CB8-C54B-94EB-0C51FB85BFE6}" type="datetimeFigureOut">
               <a:rPr lang="en-US" smtClean="0"/>
-              <a:t>11/25/21</a:t>
+              <a:t>11/3/22</a:t>
             </a:fld>
             <a:endParaRPr lang="en-US"/>
           </a:p>
@@ -3041,7 +2960,7 @@
           <a:p>
             <a:fld id="{7212EF1E-2CB8-C54B-94EB-0C51FB85BFE6}" type="datetimeFigureOut">
               <a:rPr lang="en-US" smtClean="0"/>
-              <a:t>11/25/21</a:t>
+              <a:t>11/3/22</a:t>
             </a:fld>
             <a:endParaRPr lang="en-US"/>
           </a:p>
@@ -3252,7 +3171,7 @@
           <a:p>
             <a:fld id="{7212EF1E-2CB8-C54B-94EB-0C51FB85BFE6}" type="datetimeFigureOut">
               <a:rPr lang="en-US" smtClean="0"/>
-              <a:t>11/25/21</a:t>
+              <a:t>11/3/22</a:t>
             </a:fld>
             <a:endParaRPr lang="en-US"/>
           </a:p>
@@ -3641,8 +3560,8 @@
         </p:nvSpPr>
         <p:spPr>
           <a:xfrm>
-            <a:off x="492541" y="573735"/>
-            <a:ext cx="8085762" cy="4801314"/>
+            <a:off x="529119" y="878535"/>
+            <a:ext cx="8085762" cy="4247317"/>
           </a:xfrm>
           <a:prstGeom prst="rect">
             <a:avLst/>
@@ -3678,7 +3597,7 @@
                 <a:latin typeface="Times New Roman" panose="02020603050405020304" pitchFamily="18" charset="0"/>
                 <a:cs typeface="Times New Roman" panose="02020603050405020304" pitchFamily="18" charset="0"/>
               </a:rPr>
-              <a:t>This research project is conducted at Ghent University. In this experiment, you will play a simple game. We will need your name in order to give you credit in the Sona, but your name will be immediately deleted after we finish data collection. The data we collect will solely be used for research purposes. </a:t>
+              <a:t>This research project is conducted at Ghent University. In this experiment, you will play a simple wheel of fortune game. The data we collect will solely be used for research purposes. </a:t>
             </a:r>
             <a:r>
               <a:rPr lang="en-GB" dirty="0">
@@ -3715,21 +3634,6 @@
                 <a:hlinkClick r:id="rId2"/>
               </a:rPr>
               <a:t>zhang.chen@ugent.be</a:t>
-            </a:r>
-            <a:r>
-              <a:rPr lang="en-US" dirty="0">
-                <a:latin typeface="Times New Roman" panose="02020603050405020304" pitchFamily="18" charset="0"/>
-                <a:cs typeface="Times New Roman" panose="02020603050405020304" pitchFamily="18" charset="0"/>
-              </a:rPr>
-              <a:t> or the lead researcher Frederick Verbruggen at </a:t>
-            </a:r>
-            <a:r>
-              <a:rPr lang="en-US" dirty="0">
-                <a:latin typeface="Times New Roman" panose="02020603050405020304" pitchFamily="18" charset="0"/>
-                <a:cs typeface="Times New Roman" panose="02020603050405020304" pitchFamily="18" charset="0"/>
-                <a:hlinkClick r:id="rId3"/>
-              </a:rPr>
-              <a:t>frederick.verbruggen@ugent.be</a:t>
             </a:r>
             <a:r>
               <a:rPr lang="en-US" dirty="0">
@@ -3790,10 +3694,10 @@
       </p:grpSpPr>
       <p:sp>
         <p:nvSpPr>
-          <p:cNvPr id="4" name="TextBox 3">
+          <p:cNvPr id="5" name="TextBox 4">
             <a:extLst>
               <a:ext uri="{FF2B5EF4-FFF2-40B4-BE49-F238E27FC236}">
-                <a16:creationId xmlns:a16="http://schemas.microsoft.com/office/drawing/2014/main" id="{DDB96637-E5C7-1A4A-9705-F6FAAB57C2D9}"/>
+                <a16:creationId xmlns:a16="http://schemas.microsoft.com/office/drawing/2014/main" id="{F24654F7-B50D-154D-95F2-62F3930906CD}"/>
               </a:ext>
             </a:extLst>
           </p:cNvPr>
@@ -3802,8 +3706,8 @@
         </p:nvSpPr>
         <p:spPr>
           <a:xfrm>
-            <a:off x="529119" y="1185927"/>
-            <a:ext cx="8085762" cy="3970318"/>
+            <a:off x="537426" y="1000368"/>
+            <a:ext cx="8085762" cy="1200329"/>
           </a:xfrm>
           <a:prstGeom prst="rect">
             <a:avLst/>
@@ -3822,49 +3726,7 @@
                 <a:latin typeface="Times New Roman" panose="02020603050405020304" pitchFamily="18" charset="0"/>
                 <a:cs typeface="Times New Roman" panose="02020603050405020304" pitchFamily="18" charset="0"/>
               </a:rPr>
-              <a:t>You will play </a:t>
-            </a:r>
-            <a:r>
-              <a:rPr lang="en-US" altLang="zh-CN" dirty="0">
-                <a:latin typeface="Times New Roman" panose="02020603050405020304" pitchFamily="18" charset="0"/>
-                <a:cs typeface="Times New Roman" panose="02020603050405020304" pitchFamily="18" charset="0"/>
-              </a:rPr>
-              <a:t>25</a:t>
-            </a:r>
-            <a:r>
-              <a:rPr lang="en-US" dirty="0">
-                <a:latin typeface="Times New Roman" panose="02020603050405020304" pitchFamily="18" charset="0"/>
-                <a:cs typeface="Times New Roman" panose="02020603050405020304" pitchFamily="18" charset="0"/>
-              </a:rPr>
-              <a:t>0 games in total (1</a:t>
-            </a:r>
-            <a:r>
-              <a:rPr lang="en-US" altLang="zh-CN" dirty="0">
-                <a:latin typeface="Times New Roman" panose="02020603050405020304" pitchFamily="18" charset="0"/>
-                <a:cs typeface="Times New Roman" panose="02020603050405020304" pitchFamily="18" charset="0"/>
-              </a:rPr>
-              <a:t>25</a:t>
-            </a:r>
-            <a:r>
-              <a:rPr lang="en-US" dirty="0">
-                <a:latin typeface="Times New Roman" panose="02020603050405020304" pitchFamily="18" charset="0"/>
-                <a:cs typeface="Times New Roman" panose="02020603050405020304" pitchFamily="18" charset="0"/>
-              </a:rPr>
-              <a:t> guessing games and </a:t>
-            </a:r>
-            <a:r>
-              <a:rPr lang="en-US" altLang="zh-CN" dirty="0">
-                <a:latin typeface="Times New Roman" panose="02020603050405020304" pitchFamily="18" charset="0"/>
-                <a:cs typeface="Times New Roman" panose="02020603050405020304" pitchFamily="18" charset="0"/>
-              </a:rPr>
-              <a:t>125</a:t>
-            </a:r>
-            <a:r>
-              <a:rPr lang="en-US" dirty="0">
-                <a:latin typeface="Times New Roman" panose="02020603050405020304" pitchFamily="18" charset="0"/>
-                <a:cs typeface="Times New Roman" panose="02020603050405020304" pitchFamily="18" charset="0"/>
-              </a:rPr>
-              <a:t> choice games). At the end of the experiment, we will randomly pick 10 guessing games and 10 choice games. The points that you get on these games will be added up. We plan to recruit around 50 participants for this experiment. The one with the most points will receive a bonus of 10 euro via bank transfer.</a:t>
+              <a:t>The numbers tell you how many cents you may win for each option.</a:t>
             </a:r>
           </a:p>
           <a:p>
@@ -3881,24 +3743,266 @@
                 <a:latin typeface="Times New Roman" panose="02020603050405020304" pitchFamily="18" charset="0"/>
                 <a:cs typeface="Times New Roman" panose="02020603050405020304" pitchFamily="18" charset="0"/>
               </a:rPr>
-              <a:t>We do not include any breaks, so feel free to take short breaks between games, if necessary. Sometimes you may see the ‘Please wait…’ message – this means that the program is processing data and will resume soon. If there is anything unclear, press F to go back to previous pages and read the rules again. If everything is clear now, press J to start playing. Good luck!</a:t>
-            </a:r>
-          </a:p>
-          <a:p>
-            <a:pPr algn="just"/>
-            <a:endParaRPr lang="en-US" b="1" dirty="0">
-              <a:latin typeface="Times New Roman" panose="02020603050405020304" pitchFamily="18" charset="0"/>
-              <a:cs typeface="Times New Roman" panose="02020603050405020304" pitchFamily="18" charset="0"/>
-            </a:endParaRPr>
-          </a:p>
-          <a:p>
-            <a:pPr algn="just"/>
-            <a:r>
-              <a:rPr lang="en-US" b="1" dirty="0">
-                <a:latin typeface="Times New Roman" panose="02020603050405020304" pitchFamily="18" charset="0"/>
-                <a:cs typeface="Times New Roman" panose="02020603050405020304" pitchFamily="18" charset="0"/>
-              </a:rPr>
-              <a:t>IMPORTANT: Do not refresh the page during the experiment. Refreshing the page will restart the experiment from the beginning.</a:t>
+              <a:t>In the example below, if you choose F, you may win 20 cents; if you choose J, you may win 30 cents.</a:t>
+            </a:r>
+          </a:p>
+        </p:txBody>
+      </p:sp>
+      <p:sp>
+        <p:nvSpPr>
+          <p:cNvPr id="6" name="TextBox 5">
+            <a:extLst>
+              <a:ext uri="{FF2B5EF4-FFF2-40B4-BE49-F238E27FC236}">
+                <a16:creationId xmlns:a16="http://schemas.microsoft.com/office/drawing/2014/main" id="{3AA524FC-A232-7A41-9444-83383FE941EE}"/>
+              </a:ext>
+            </a:extLst>
+          </p:cNvPr>
+          <p:cNvSpPr txBox="1"/>
+          <p:nvPr/>
+        </p:nvSpPr>
+        <p:spPr>
+          <a:xfrm>
+            <a:off x="586529" y="322729"/>
+            <a:ext cx="7912012" cy="584775"/>
+          </a:xfrm>
+          <a:prstGeom prst="rect">
+            <a:avLst/>
+          </a:prstGeom>
+          <a:noFill/>
+        </p:spPr>
+        <p:txBody>
+          <a:bodyPr wrap="square" rtlCol="0">
+            <a:spAutoFit/>
+          </a:bodyPr>
+          <a:lstStyle/>
+          <a:p>
+            <a:pPr algn="ctr"/>
+            <a:r>
+              <a:rPr lang="en-BE" sz="3200" dirty="0">
+                <a:latin typeface="Times New Roman" panose="02020603050405020304" pitchFamily="18" charset="0"/>
+                <a:cs typeface="Times New Roman" panose="02020603050405020304" pitchFamily="18" charset="0"/>
+              </a:rPr>
+              <a:t>Rules of the </a:t>
+            </a:r>
+            <a:r>
+              <a:rPr lang="en-BE" sz="3200" b="1" dirty="0">
+                <a:latin typeface="Times New Roman" panose="02020603050405020304" pitchFamily="18" charset="0"/>
+                <a:cs typeface="Times New Roman" panose="02020603050405020304" pitchFamily="18" charset="0"/>
+              </a:rPr>
+              <a:t>choice</a:t>
+            </a:r>
+            <a:r>
+              <a:rPr lang="en-BE" sz="3200" dirty="0">
+                <a:latin typeface="Times New Roman" panose="02020603050405020304" pitchFamily="18" charset="0"/>
+                <a:cs typeface="Times New Roman" panose="02020603050405020304" pitchFamily="18" charset="0"/>
+              </a:rPr>
+              <a:t> game</a:t>
+            </a:r>
+          </a:p>
+        </p:txBody>
+      </p:sp>
+      <p:sp>
+        <p:nvSpPr>
+          <p:cNvPr id="7" name="TextBox 6">
+            <a:extLst>
+              <a:ext uri="{FF2B5EF4-FFF2-40B4-BE49-F238E27FC236}">
+                <a16:creationId xmlns:a16="http://schemas.microsoft.com/office/drawing/2014/main" id="{0ECA1A5C-CB10-F24D-9534-99C41C2319E3}"/>
+              </a:ext>
+            </a:extLst>
+          </p:cNvPr>
+          <p:cNvSpPr txBox="1"/>
+          <p:nvPr/>
+        </p:nvSpPr>
+        <p:spPr>
+          <a:xfrm>
+            <a:off x="537426" y="6092580"/>
+            <a:ext cx="8085762" cy="369332"/>
+          </a:xfrm>
+          <a:prstGeom prst="rect">
+            <a:avLst/>
+          </a:prstGeom>
+          <a:noFill/>
+        </p:spPr>
+        <p:txBody>
+          <a:bodyPr wrap="square" rtlCol="0">
+            <a:spAutoFit/>
+          </a:bodyPr>
+          <a:lstStyle/>
+          <a:p>
+            <a:pPr algn="ctr"/>
+            <a:r>
+              <a:rPr lang="en-US" dirty="0">
+                <a:latin typeface="Times New Roman" panose="02020603050405020304" pitchFamily="18" charset="0"/>
+                <a:cs typeface="Times New Roman" panose="02020603050405020304" pitchFamily="18" charset="0"/>
+              </a:rPr>
+              <a:t>Press F to see the previous page; press J to see the next page.</a:t>
+            </a:r>
+          </a:p>
+        </p:txBody>
+      </p:sp>
+      <p:pic>
+        <p:nvPicPr>
+          <p:cNvPr id="2" name="Picture 1">
+            <a:extLst>
+              <a:ext uri="{FF2B5EF4-FFF2-40B4-BE49-F238E27FC236}">
+                <a16:creationId xmlns:a16="http://schemas.microsoft.com/office/drawing/2014/main" id="{933F495C-434D-85C8-F741-3219BC4173A8}"/>
+              </a:ext>
+            </a:extLst>
+          </p:cNvPr>
+          <p:cNvPicPr>
+            <a:picLocks noChangeAspect="1"/>
+          </p:cNvPicPr>
+          <p:nvPr/>
+        </p:nvPicPr>
+        <p:blipFill>
+          <a:blip r:embed="rId2"/>
+          <a:stretch>
+            <a:fillRect/>
+          </a:stretch>
+        </p:blipFill>
+        <p:spPr>
+          <a:xfrm>
+            <a:off x="989582" y="2554207"/>
+            <a:ext cx="5188525" cy="3184862"/>
+          </a:xfrm>
+          <a:prstGeom prst="rect">
+            <a:avLst/>
+          </a:prstGeom>
+          <a:ln w="19050">
+            <a:solidFill>
+              <a:schemeClr val="tx1"/>
+            </a:solidFill>
+          </a:ln>
+        </p:spPr>
+      </p:pic>
+      <p:sp>
+        <p:nvSpPr>
+          <p:cNvPr id="4" name="Rectangle 3">
+            <a:extLst>
+              <a:ext uri="{FF2B5EF4-FFF2-40B4-BE49-F238E27FC236}">
+                <a16:creationId xmlns:a16="http://schemas.microsoft.com/office/drawing/2014/main" id="{0415C810-E518-DF3B-1978-E315378ADC33}"/>
+              </a:ext>
+            </a:extLst>
+          </p:cNvPr>
+          <p:cNvSpPr/>
+          <p:nvPr/>
+        </p:nvSpPr>
+        <p:spPr>
+          <a:xfrm>
+            <a:off x="1817076" y="2741868"/>
+            <a:ext cx="3411416" cy="457200"/>
+          </a:xfrm>
+          <a:prstGeom prst="rect">
+            <a:avLst/>
+          </a:prstGeom>
+          <a:noFill/>
+          <a:ln w="25400">
+            <a:solidFill>
+              <a:srgbClr val="C00000"/>
+            </a:solidFill>
+          </a:ln>
+        </p:spPr>
+        <p:style>
+          <a:lnRef idx="1">
+            <a:schemeClr val="accent1"/>
+          </a:lnRef>
+          <a:fillRef idx="3">
+            <a:schemeClr val="accent1"/>
+          </a:fillRef>
+          <a:effectRef idx="2">
+            <a:schemeClr val="accent1"/>
+          </a:effectRef>
+          <a:fontRef idx="minor">
+            <a:schemeClr val="lt1"/>
+          </a:fontRef>
+        </p:style>
+        <p:txBody>
+          <a:bodyPr rtlCol="0" anchor="ctr"/>
+          <a:lstStyle/>
+          <a:p>
+            <a:pPr algn="ctr"/>
+            <a:endParaRPr lang="en-BE"/>
+          </a:p>
+        </p:txBody>
+      </p:sp>
+      <p:cxnSp>
+        <p:nvCxnSpPr>
+          <p:cNvPr id="9" name="Straight Arrow Connector 8">
+            <a:extLst>
+              <a:ext uri="{FF2B5EF4-FFF2-40B4-BE49-F238E27FC236}">
+                <a16:creationId xmlns:a16="http://schemas.microsoft.com/office/drawing/2014/main" id="{BC47EDB7-78AE-F476-0579-6882B050165F}"/>
+              </a:ext>
+            </a:extLst>
+          </p:cNvPr>
+          <p:cNvCxnSpPr>
+            <a:stCxn id="4" idx="3"/>
+          </p:cNvCxnSpPr>
+          <p:nvPr/>
+        </p:nvCxnSpPr>
+        <p:spPr>
+          <a:xfrm>
+            <a:off x="5228492" y="2970468"/>
+            <a:ext cx="1195754" cy="5861"/>
+          </a:xfrm>
+          <a:prstGeom prst="straightConnector1">
+            <a:avLst/>
+          </a:prstGeom>
+          <a:ln>
+            <a:solidFill>
+              <a:srgbClr val="C00000"/>
+            </a:solidFill>
+            <a:tailEnd type="triangle"/>
+          </a:ln>
+        </p:spPr>
+        <p:style>
+          <a:lnRef idx="2">
+            <a:schemeClr val="accent1"/>
+          </a:lnRef>
+          <a:fillRef idx="0">
+            <a:schemeClr val="accent1"/>
+          </a:fillRef>
+          <a:effectRef idx="1">
+            <a:schemeClr val="accent1"/>
+          </a:effectRef>
+          <a:fontRef idx="minor">
+            <a:schemeClr val="tx1"/>
+          </a:fontRef>
+        </p:style>
+      </p:cxnSp>
+      <p:sp>
+        <p:nvSpPr>
+          <p:cNvPr id="10" name="TextBox 9">
+            <a:extLst>
+              <a:ext uri="{FF2B5EF4-FFF2-40B4-BE49-F238E27FC236}">
+                <a16:creationId xmlns:a16="http://schemas.microsoft.com/office/drawing/2014/main" id="{6094B156-BC80-CA9E-4369-3E2F2C0A4080}"/>
+              </a:ext>
+            </a:extLst>
+          </p:cNvPr>
+          <p:cNvSpPr txBox="1"/>
+          <p:nvPr/>
+        </p:nvSpPr>
+        <p:spPr>
+          <a:xfrm>
+            <a:off x="6424246" y="2785802"/>
+            <a:ext cx="2543908" cy="923330"/>
+          </a:xfrm>
+          <a:prstGeom prst="rect">
+            <a:avLst/>
+          </a:prstGeom>
+          <a:noFill/>
+        </p:spPr>
+        <p:txBody>
+          <a:bodyPr wrap="square" rtlCol="0">
+            <a:spAutoFit/>
+          </a:bodyPr>
+          <a:lstStyle/>
+          <a:p>
+            <a:r>
+              <a:rPr lang="en-BE" dirty="0">
+                <a:latin typeface="Times New Roman" panose="02020603050405020304" pitchFamily="18" charset="0"/>
+                <a:cs typeface="Times New Roman" panose="02020603050405020304" pitchFamily="18" charset="0"/>
+              </a:rPr>
+              <a:t>Numbers show how much money you can win from each option.</a:t>
             </a:r>
           </a:p>
         </p:txBody>
@@ -3906,7 +4010,7 @@
     </p:spTree>
     <p:extLst>
       <p:ext uri="{BB962C8B-B14F-4D97-AF65-F5344CB8AC3E}">
-        <p14:creationId xmlns:p14="http://schemas.microsoft.com/office/powerpoint/2010/main" val="1988374102"/>
+        <p14:creationId xmlns:p14="http://schemas.microsoft.com/office/powerpoint/2010/main" val="302556034"/>
       </p:ext>
     </p:extLst>
   </p:cSld>
@@ -3935,10 +4039,10 @@
       </p:grpSpPr>
       <p:sp>
         <p:nvSpPr>
-          <p:cNvPr id="8" name="TextBox 7">
+          <p:cNvPr id="5" name="TextBox 4">
             <a:extLst>
               <a:ext uri="{FF2B5EF4-FFF2-40B4-BE49-F238E27FC236}">
-                <a16:creationId xmlns:a16="http://schemas.microsoft.com/office/drawing/2014/main" id="{974770A9-F67D-D541-AF45-2EF49C92E356}"/>
+                <a16:creationId xmlns:a16="http://schemas.microsoft.com/office/drawing/2014/main" id="{F24654F7-B50D-154D-95F2-62F3930906CD}"/>
               </a:ext>
             </a:extLst>
           </p:cNvPr>
@@ -3947,8 +4051,8 @@
         </p:nvSpPr>
         <p:spPr>
           <a:xfrm>
-            <a:off x="529119" y="2071771"/>
-            <a:ext cx="8085762" cy="2585323"/>
+            <a:off x="537426" y="1000368"/>
+            <a:ext cx="8085762" cy="1477328"/>
           </a:xfrm>
           <a:prstGeom prst="rect">
             <a:avLst/>
@@ -3967,19 +4071,8 @@
                 <a:latin typeface="Times New Roman" panose="02020603050405020304" pitchFamily="18" charset="0"/>
                 <a:cs typeface="Times New Roman" panose="02020603050405020304" pitchFamily="18" charset="0"/>
               </a:rPr>
-              <a:t>That was the first task. The program has randomly picked 10 guessing games and 10 choice games and recorded the total amount of points you have. We will reveal this at the end of </a:t>
-            </a:r>
-            <a:r>
-              <a:rPr lang="en-US">
-                <a:latin typeface="Times New Roman" panose="02020603050405020304" pitchFamily="18" charset="0"/>
-                <a:cs typeface="Times New Roman" panose="02020603050405020304" pitchFamily="18" charset="0"/>
-              </a:rPr>
-              <a:t>the experiment.</a:t>
-            </a:r>
-            <a:endParaRPr lang="en-US" dirty="0">
-              <a:latin typeface="Times New Roman" panose="02020603050405020304" pitchFamily="18" charset="0"/>
-              <a:cs typeface="Times New Roman" panose="02020603050405020304" pitchFamily="18" charset="0"/>
-            </a:endParaRPr>
+              <a:t>The pie charts tell you the chance of winning. The bigger the green area, the higher the chance of winning.</a:t>
+            </a:r>
           </a:p>
           <a:p>
             <a:pPr algn="just"/>
@@ -3995,17 +4088,17 @@
                 <a:latin typeface="Times New Roman" panose="02020603050405020304" pitchFamily="18" charset="0"/>
                 <a:cs typeface="Times New Roman" panose="02020603050405020304" pitchFamily="18" charset="0"/>
               </a:rPr>
-              <a:t>In this second task, you will see 9 questions about your past experiences with gambling. For each question, indicate how often the situation described in the question has occurred to you, by selecting Never, Sometimes, Most of the time or Almost always. You will use the computer mouse or the touchpad to answer these questions.</a:t>
-            </a:r>
-          </a:p>
-        </p:txBody>
-      </p:sp>
-      <p:sp>
-        <p:nvSpPr>
-          <p:cNvPr id="15" name="TextBox 14">
+              <a:t>In the example below, if you choose F, you have a 70% chance of winning 20 cents; if you choose J, you have a 30% chance of winning 30 cents.</a:t>
+            </a:r>
+          </a:p>
+        </p:txBody>
+      </p:sp>
+      <p:sp>
+        <p:nvSpPr>
+          <p:cNvPr id="6" name="TextBox 5">
             <a:extLst>
               <a:ext uri="{FF2B5EF4-FFF2-40B4-BE49-F238E27FC236}">
-                <a16:creationId xmlns:a16="http://schemas.microsoft.com/office/drawing/2014/main" id="{9E7A20CA-0632-4F4D-9AFF-C65AC72697AC}"/>
+                <a16:creationId xmlns:a16="http://schemas.microsoft.com/office/drawing/2014/main" id="{3AA524FC-A232-7A41-9444-83383FE941EE}"/>
               </a:ext>
             </a:extLst>
           </p:cNvPr>
@@ -4014,8 +4107,8 @@
         </p:nvSpPr>
         <p:spPr>
           <a:xfrm>
-            <a:off x="537426" y="6092580"/>
-            <a:ext cx="8085762" cy="369332"/>
+            <a:off x="586529" y="322729"/>
+            <a:ext cx="7912012" cy="584775"/>
           </a:xfrm>
           <a:prstGeom prst="rect">
             <a:avLst/>
@@ -4030,224 +4123,239 @@
           <a:p>
             <a:pPr algn="ctr"/>
             <a:r>
-              <a:rPr lang="en-US" dirty="0">
-                <a:latin typeface="Times New Roman" panose="02020603050405020304" pitchFamily="18" charset="0"/>
-                <a:cs typeface="Times New Roman" panose="02020603050405020304" pitchFamily="18" charset="0"/>
-              </a:rPr>
-              <a:t>Press J to continue.</a:t>
-            </a:r>
-          </a:p>
-        </p:txBody>
-      </p:sp>
-      <p:grpSp>
-        <p:nvGrpSpPr>
-          <p:cNvPr id="16" name="Group 15">
+              <a:rPr lang="en-BE" sz="3200" dirty="0">
+                <a:latin typeface="Times New Roman" panose="02020603050405020304" pitchFamily="18" charset="0"/>
+                <a:cs typeface="Times New Roman" panose="02020603050405020304" pitchFamily="18" charset="0"/>
+              </a:rPr>
+              <a:t>Rules of the </a:t>
+            </a:r>
+            <a:r>
+              <a:rPr lang="en-BE" sz="3200" b="1" dirty="0">
+                <a:latin typeface="Times New Roman" panose="02020603050405020304" pitchFamily="18" charset="0"/>
+                <a:cs typeface="Times New Roman" panose="02020603050405020304" pitchFamily="18" charset="0"/>
+              </a:rPr>
+              <a:t>choice</a:t>
+            </a:r>
+            <a:r>
+              <a:rPr lang="en-BE" sz="3200" dirty="0">
+                <a:latin typeface="Times New Roman" panose="02020603050405020304" pitchFamily="18" charset="0"/>
+                <a:cs typeface="Times New Roman" panose="02020603050405020304" pitchFamily="18" charset="0"/>
+              </a:rPr>
+              <a:t> game</a:t>
+            </a:r>
+          </a:p>
+        </p:txBody>
+      </p:sp>
+      <p:sp>
+        <p:nvSpPr>
+          <p:cNvPr id="7" name="TextBox 6">
             <a:extLst>
               <a:ext uri="{FF2B5EF4-FFF2-40B4-BE49-F238E27FC236}">
-                <a16:creationId xmlns:a16="http://schemas.microsoft.com/office/drawing/2014/main" id="{85979EA4-E847-5344-9243-C3223FBA9B01}"/>
+                <a16:creationId xmlns:a16="http://schemas.microsoft.com/office/drawing/2014/main" id="{0ECA1A5C-CB10-F24D-9534-99C41C2319E3}"/>
               </a:ext>
             </a:extLst>
           </p:cNvPr>
-          <p:cNvGrpSpPr/>
+          <p:cNvSpPr txBox="1"/>
           <p:nvPr/>
-        </p:nvGrpSpPr>
-        <p:grpSpPr>
-          <a:xfrm>
-            <a:off x="701139" y="699848"/>
-            <a:ext cx="7741722" cy="430306"/>
-            <a:chOff x="-12991" y="1317811"/>
-            <a:chExt cx="7741722" cy="430306"/>
-          </a:xfrm>
-        </p:grpSpPr>
-        <p:sp>
-          <p:nvSpPr>
-            <p:cNvPr id="17" name="Rectangle 16">
-              <a:extLst>
-                <a:ext uri="{FF2B5EF4-FFF2-40B4-BE49-F238E27FC236}">
-                  <a16:creationId xmlns:a16="http://schemas.microsoft.com/office/drawing/2014/main" id="{2D14D166-57DE-6740-8F76-515687CA6CA1}"/>
-                </a:ext>
-              </a:extLst>
-            </p:cNvPr>
-            <p:cNvSpPr/>
-            <p:nvPr/>
-          </p:nvSpPr>
-          <p:spPr>
-            <a:xfrm>
-              <a:off x="-12991" y="1317811"/>
-              <a:ext cx="5741438" cy="430306"/>
-            </a:xfrm>
-            <a:prstGeom prst="rect">
-              <a:avLst/>
-            </a:prstGeom>
+        </p:nvSpPr>
+        <p:spPr>
+          <a:xfrm>
+            <a:off x="537426" y="6092580"/>
+            <a:ext cx="8085762" cy="369332"/>
+          </a:xfrm>
+          <a:prstGeom prst="rect">
+            <a:avLst/>
+          </a:prstGeom>
+          <a:noFill/>
+        </p:spPr>
+        <p:txBody>
+          <a:bodyPr wrap="square" rtlCol="0">
+            <a:spAutoFit/>
+          </a:bodyPr>
+          <a:lstStyle/>
+          <a:p>
+            <a:pPr algn="ctr"/>
+            <a:r>
+              <a:rPr lang="en-US" dirty="0">
+                <a:latin typeface="Times New Roman" panose="02020603050405020304" pitchFamily="18" charset="0"/>
+                <a:cs typeface="Times New Roman" panose="02020603050405020304" pitchFamily="18" charset="0"/>
+              </a:rPr>
+              <a:t>Press F to see the previous page; press J to see the next page.</a:t>
+            </a:r>
+          </a:p>
+        </p:txBody>
+      </p:sp>
+      <p:pic>
+        <p:nvPicPr>
+          <p:cNvPr id="3" name="Picture 2">
+            <a:extLst>
+              <a:ext uri="{FF2B5EF4-FFF2-40B4-BE49-F238E27FC236}">
+                <a16:creationId xmlns:a16="http://schemas.microsoft.com/office/drawing/2014/main" id="{51128C8D-94DB-6EB9-B1A0-A335890F01F3}"/>
+              </a:ext>
+            </a:extLst>
+          </p:cNvPr>
+          <p:cNvPicPr>
+            <a:picLocks noChangeAspect="1"/>
+          </p:cNvPicPr>
+          <p:nvPr/>
+        </p:nvPicPr>
+        <p:blipFill>
+          <a:blip r:embed="rId2"/>
+          <a:stretch>
+            <a:fillRect/>
+          </a:stretch>
+        </p:blipFill>
+        <p:spPr>
+          <a:xfrm>
+            <a:off x="989582" y="2554207"/>
+            <a:ext cx="5188525" cy="3184862"/>
+          </a:xfrm>
+          <a:prstGeom prst="rect">
+            <a:avLst/>
+          </a:prstGeom>
+          <a:ln w="19050">
             <a:solidFill>
-              <a:schemeClr val="bg1">
-                <a:lumMod val="75000"/>
-              </a:schemeClr>
+              <a:schemeClr val="tx1"/>
             </a:solidFill>
-            <a:ln w="25400">
-              <a:solidFill>
-                <a:schemeClr val="tx1"/>
-              </a:solidFill>
-            </a:ln>
-            <a:effectLst/>
-          </p:spPr>
-          <p:style>
-            <a:lnRef idx="1">
-              <a:schemeClr val="accent1"/>
-            </a:lnRef>
-            <a:fillRef idx="3">
-              <a:schemeClr val="accent1"/>
-            </a:fillRef>
-            <a:effectRef idx="2">
-              <a:schemeClr val="accent1"/>
-            </a:effectRef>
-            <a:fontRef idx="minor">
-              <a:schemeClr val="lt1"/>
-            </a:fontRef>
-          </p:style>
-          <p:txBody>
-            <a:bodyPr rtlCol="0" anchor="ctr"/>
-            <a:lstStyle/>
-            <a:p>
-              <a:pPr algn="ctr"/>
-              <a:r>
-                <a:rPr lang="en-BE" dirty="0">
-                  <a:solidFill>
-                    <a:schemeClr val="tx1"/>
-                  </a:solidFill>
-                </a:rPr>
-                <a:t>1</a:t>
-              </a:r>
-            </a:p>
-          </p:txBody>
-        </p:sp>
-        <p:sp>
-          <p:nvSpPr>
-            <p:cNvPr id="18" name="Rectangle 17">
-              <a:extLst>
-                <a:ext uri="{FF2B5EF4-FFF2-40B4-BE49-F238E27FC236}">
-                  <a16:creationId xmlns:a16="http://schemas.microsoft.com/office/drawing/2014/main" id="{08222CE2-43BE-014C-8C5C-47576D035DB7}"/>
-                </a:ext>
-              </a:extLst>
-            </p:cNvPr>
-            <p:cNvSpPr/>
-            <p:nvPr/>
-          </p:nvSpPr>
-          <p:spPr>
-            <a:xfrm>
-              <a:off x="5728447" y="1317811"/>
-              <a:ext cx="819815" cy="430306"/>
-            </a:xfrm>
-            <a:prstGeom prst="rect">
-              <a:avLst/>
-            </a:prstGeom>
+          </a:ln>
+        </p:spPr>
+      </p:pic>
+      <p:sp>
+        <p:nvSpPr>
+          <p:cNvPr id="4" name="Rectangle 3">
+            <a:extLst>
+              <a:ext uri="{FF2B5EF4-FFF2-40B4-BE49-F238E27FC236}">
+                <a16:creationId xmlns:a16="http://schemas.microsoft.com/office/drawing/2014/main" id="{564B40EE-7A27-0D22-0A11-E4708D36199C}"/>
+              </a:ext>
+            </a:extLst>
+          </p:cNvPr>
+          <p:cNvSpPr/>
+          <p:nvPr/>
+        </p:nvSpPr>
+        <p:spPr>
+          <a:xfrm>
+            <a:off x="1160584" y="3200399"/>
+            <a:ext cx="4829908" cy="1969477"/>
+          </a:xfrm>
+          <a:prstGeom prst="rect">
+            <a:avLst/>
+          </a:prstGeom>
+          <a:noFill/>
+          <a:ln w="25400">
             <a:solidFill>
-              <a:srgbClr val="00B050"/>
+              <a:srgbClr val="C00000"/>
             </a:solidFill>
-            <a:ln w="25400">
-              <a:solidFill>
-                <a:schemeClr val="tx1"/>
-              </a:solidFill>
-            </a:ln>
-            <a:effectLst/>
-          </p:spPr>
-          <p:style>
-            <a:lnRef idx="1">
-              <a:schemeClr val="accent1"/>
-            </a:lnRef>
-            <a:fillRef idx="3">
-              <a:schemeClr val="accent1"/>
-            </a:fillRef>
-            <a:effectRef idx="2">
-              <a:schemeClr val="accent1"/>
-            </a:effectRef>
-            <a:fontRef idx="minor">
-              <a:schemeClr val="lt1"/>
-            </a:fontRef>
-          </p:style>
-          <p:txBody>
-            <a:bodyPr rtlCol="0" anchor="ctr"/>
-            <a:lstStyle/>
-            <a:p>
-              <a:pPr algn="ctr"/>
-              <a:r>
-                <a:rPr lang="en-BE" dirty="0">
-                  <a:solidFill>
-                    <a:schemeClr val="tx1"/>
-                  </a:solidFill>
-                </a:rPr>
-                <a:t>2</a:t>
-              </a:r>
-            </a:p>
-          </p:txBody>
-        </p:sp>
-        <p:sp>
-          <p:nvSpPr>
-            <p:cNvPr id="19" name="Rectangle 18">
-              <a:extLst>
-                <a:ext uri="{FF2B5EF4-FFF2-40B4-BE49-F238E27FC236}">
-                  <a16:creationId xmlns:a16="http://schemas.microsoft.com/office/drawing/2014/main" id="{A962C385-4085-7E46-AE1A-9FABDDCB59B6}"/>
-                </a:ext>
-              </a:extLst>
-            </p:cNvPr>
-            <p:cNvSpPr/>
-            <p:nvPr/>
-          </p:nvSpPr>
-          <p:spPr>
-            <a:xfrm>
-              <a:off x="6548262" y="1317811"/>
-              <a:ext cx="1180469" cy="430306"/>
-            </a:xfrm>
-            <a:prstGeom prst="rect">
-              <a:avLst/>
-            </a:prstGeom>
+          </a:ln>
+        </p:spPr>
+        <p:style>
+          <a:lnRef idx="1">
+            <a:schemeClr val="accent1"/>
+          </a:lnRef>
+          <a:fillRef idx="3">
+            <a:schemeClr val="accent1"/>
+          </a:fillRef>
+          <a:effectRef idx="2">
+            <a:schemeClr val="accent1"/>
+          </a:effectRef>
+          <a:fontRef idx="minor">
+            <a:schemeClr val="lt1"/>
+          </a:fontRef>
+        </p:style>
+        <p:txBody>
+          <a:bodyPr rtlCol="0" anchor="ctr"/>
+          <a:lstStyle/>
+          <a:p>
+            <a:pPr algn="ctr"/>
+            <a:endParaRPr lang="en-BE"/>
+          </a:p>
+        </p:txBody>
+      </p:sp>
+      <p:cxnSp>
+        <p:nvCxnSpPr>
+          <p:cNvPr id="8" name="Straight Arrow Connector 7">
+            <a:extLst>
+              <a:ext uri="{FF2B5EF4-FFF2-40B4-BE49-F238E27FC236}">
+                <a16:creationId xmlns:a16="http://schemas.microsoft.com/office/drawing/2014/main" id="{81D6CA94-8E00-3CB6-B385-42E3F14B1D10}"/>
+              </a:ext>
+            </a:extLst>
+          </p:cNvPr>
+          <p:cNvCxnSpPr>
+            <a:cxnSpLocks/>
+          </p:cNvCxnSpPr>
+          <p:nvPr/>
+        </p:nvCxnSpPr>
+        <p:spPr>
+          <a:xfrm>
+            <a:off x="5990492" y="4134913"/>
+            <a:ext cx="433754" cy="0"/>
+          </a:xfrm>
+          <a:prstGeom prst="straightConnector1">
+            <a:avLst/>
+          </a:prstGeom>
+          <a:ln>
             <a:solidFill>
-              <a:schemeClr val="bg1">
-                <a:lumMod val="75000"/>
-              </a:schemeClr>
+              <a:srgbClr val="C00000"/>
             </a:solidFill>
-            <a:ln w="25400">
-              <a:solidFill>
-                <a:schemeClr val="tx1"/>
-              </a:solidFill>
-            </a:ln>
-            <a:effectLst/>
-          </p:spPr>
-          <p:style>
-            <a:lnRef idx="1">
-              <a:schemeClr val="accent1"/>
-            </a:lnRef>
-            <a:fillRef idx="3">
-              <a:schemeClr val="accent1"/>
-            </a:fillRef>
-            <a:effectRef idx="2">
-              <a:schemeClr val="accent1"/>
-            </a:effectRef>
-            <a:fontRef idx="minor">
-              <a:schemeClr val="lt1"/>
-            </a:fontRef>
-          </p:style>
-          <p:txBody>
-            <a:bodyPr rtlCol="0" anchor="ctr"/>
-            <a:lstStyle/>
-            <a:p>
-              <a:pPr algn="ctr"/>
-              <a:r>
-                <a:rPr lang="en-BE" dirty="0">
-                  <a:solidFill>
-                    <a:schemeClr val="tx1"/>
-                  </a:solidFill>
-                </a:rPr>
-                <a:t>3</a:t>
-              </a:r>
-            </a:p>
-          </p:txBody>
-        </p:sp>
-      </p:grpSp>
+            <a:tailEnd type="triangle"/>
+          </a:ln>
+        </p:spPr>
+        <p:style>
+          <a:lnRef idx="2">
+            <a:schemeClr val="accent1"/>
+          </a:lnRef>
+          <a:fillRef idx="0">
+            <a:schemeClr val="accent1"/>
+          </a:fillRef>
+          <a:effectRef idx="1">
+            <a:schemeClr val="accent1"/>
+          </a:effectRef>
+          <a:fontRef idx="minor">
+            <a:schemeClr val="tx1"/>
+          </a:fontRef>
+        </p:style>
+      </p:cxnSp>
+      <p:sp>
+        <p:nvSpPr>
+          <p:cNvPr id="9" name="TextBox 8">
+            <a:extLst>
+              <a:ext uri="{FF2B5EF4-FFF2-40B4-BE49-F238E27FC236}">
+                <a16:creationId xmlns:a16="http://schemas.microsoft.com/office/drawing/2014/main" id="{824239A7-7729-3DCE-E506-D3463286BD54}"/>
+              </a:ext>
+            </a:extLst>
+          </p:cNvPr>
+          <p:cNvSpPr txBox="1"/>
+          <p:nvPr/>
+        </p:nvSpPr>
+        <p:spPr>
+          <a:xfrm>
+            <a:off x="6424246" y="3918640"/>
+            <a:ext cx="2543908" cy="923330"/>
+          </a:xfrm>
+          <a:prstGeom prst="rect">
+            <a:avLst/>
+          </a:prstGeom>
+          <a:noFill/>
+        </p:spPr>
+        <p:txBody>
+          <a:bodyPr wrap="square" rtlCol="0">
+            <a:spAutoFit/>
+          </a:bodyPr>
+          <a:lstStyle/>
+          <a:p>
+            <a:r>
+              <a:rPr lang="en-BE" dirty="0">
+                <a:latin typeface="Times New Roman" panose="02020603050405020304" pitchFamily="18" charset="0"/>
+                <a:cs typeface="Times New Roman" panose="02020603050405020304" pitchFamily="18" charset="0"/>
+              </a:rPr>
+              <a:t>Pie charts show the probability of winning for each option.</a:t>
+            </a:r>
+          </a:p>
+        </p:txBody>
+      </p:sp>
     </p:spTree>
     <p:extLst>
       <p:ext uri="{BB962C8B-B14F-4D97-AF65-F5344CB8AC3E}">
-        <p14:creationId xmlns:p14="http://schemas.microsoft.com/office/powerpoint/2010/main" val="68709908"/>
+        <p14:creationId xmlns:p14="http://schemas.microsoft.com/office/powerpoint/2010/main" val="1398320354"/>
       </p:ext>
     </p:extLst>
   </p:cSld>
@@ -4276,6 +4384,621 @@
       </p:grpSpPr>
       <p:sp>
         <p:nvSpPr>
+          <p:cNvPr id="5" name="TextBox 4">
+            <a:extLst>
+              <a:ext uri="{FF2B5EF4-FFF2-40B4-BE49-F238E27FC236}">
+                <a16:creationId xmlns:a16="http://schemas.microsoft.com/office/drawing/2014/main" id="{F24654F7-B50D-154D-95F2-62F3930906CD}"/>
+              </a:ext>
+            </a:extLst>
+          </p:cNvPr>
+          <p:cNvSpPr txBox="1"/>
+          <p:nvPr/>
+        </p:nvSpPr>
+        <p:spPr>
+          <a:xfrm>
+            <a:off x="537426" y="1000368"/>
+            <a:ext cx="8085762" cy="1477328"/>
+          </a:xfrm>
+          <a:prstGeom prst="rect">
+            <a:avLst/>
+          </a:prstGeom>
+          <a:noFill/>
+        </p:spPr>
+        <p:txBody>
+          <a:bodyPr wrap="square" rtlCol="0">
+            <a:spAutoFit/>
+          </a:bodyPr>
+          <a:lstStyle/>
+          <a:p>
+            <a:pPr algn="just"/>
+            <a:r>
+              <a:rPr lang="en-US" b="1" dirty="0">
+                <a:latin typeface="Times New Roman" panose="02020603050405020304" pitchFamily="18" charset="0"/>
+                <a:cs typeface="Times New Roman" panose="02020603050405020304" pitchFamily="18" charset="0"/>
+              </a:rPr>
+              <a:t>Your task is to choose which wheel you want to play, by pressing F or J</a:t>
+            </a:r>
+            <a:r>
+              <a:rPr lang="en-US" dirty="0">
+                <a:latin typeface="Times New Roman" panose="02020603050405020304" pitchFamily="18" charset="0"/>
+                <a:cs typeface="Times New Roman" panose="02020603050405020304" pitchFamily="18" charset="0"/>
+              </a:rPr>
+              <a:t>. After you have made your choice, the program will spin the chosen wheel.</a:t>
+            </a:r>
+          </a:p>
+          <a:p>
+            <a:pPr algn="just"/>
+            <a:endParaRPr lang="en-US" dirty="0">
+              <a:latin typeface="Times New Roman" panose="02020603050405020304" pitchFamily="18" charset="0"/>
+              <a:cs typeface="Times New Roman" panose="02020603050405020304" pitchFamily="18" charset="0"/>
+            </a:endParaRPr>
+          </a:p>
+          <a:p>
+            <a:pPr algn="just"/>
+            <a:r>
+              <a:rPr lang="en-US" dirty="0">
+                <a:latin typeface="Times New Roman" panose="02020603050405020304" pitchFamily="18" charset="0"/>
+                <a:cs typeface="Times New Roman" panose="02020603050405020304" pitchFamily="18" charset="0"/>
+              </a:rPr>
+              <a:t>If the black arrow ends up pointing at green, you win money; if the black arrow points at gray, then you do not win any money (see the example below). </a:t>
+            </a:r>
+          </a:p>
+        </p:txBody>
+      </p:sp>
+      <p:sp>
+        <p:nvSpPr>
+          <p:cNvPr id="6" name="TextBox 5">
+            <a:extLst>
+              <a:ext uri="{FF2B5EF4-FFF2-40B4-BE49-F238E27FC236}">
+                <a16:creationId xmlns:a16="http://schemas.microsoft.com/office/drawing/2014/main" id="{3AA524FC-A232-7A41-9444-83383FE941EE}"/>
+              </a:ext>
+            </a:extLst>
+          </p:cNvPr>
+          <p:cNvSpPr txBox="1"/>
+          <p:nvPr/>
+        </p:nvSpPr>
+        <p:spPr>
+          <a:xfrm>
+            <a:off x="586529" y="322729"/>
+            <a:ext cx="7912012" cy="584775"/>
+          </a:xfrm>
+          <a:prstGeom prst="rect">
+            <a:avLst/>
+          </a:prstGeom>
+          <a:noFill/>
+        </p:spPr>
+        <p:txBody>
+          <a:bodyPr wrap="square" rtlCol="0">
+            <a:spAutoFit/>
+          </a:bodyPr>
+          <a:lstStyle/>
+          <a:p>
+            <a:pPr algn="ctr"/>
+            <a:r>
+              <a:rPr lang="en-BE" sz="3200" dirty="0">
+                <a:latin typeface="Times New Roman" panose="02020603050405020304" pitchFamily="18" charset="0"/>
+                <a:cs typeface="Times New Roman" panose="02020603050405020304" pitchFamily="18" charset="0"/>
+              </a:rPr>
+              <a:t>Rules of the </a:t>
+            </a:r>
+            <a:r>
+              <a:rPr lang="en-BE" sz="3200" b="1" dirty="0">
+                <a:latin typeface="Times New Roman" panose="02020603050405020304" pitchFamily="18" charset="0"/>
+                <a:cs typeface="Times New Roman" panose="02020603050405020304" pitchFamily="18" charset="0"/>
+              </a:rPr>
+              <a:t>choice</a:t>
+            </a:r>
+            <a:r>
+              <a:rPr lang="en-BE" sz="3200" dirty="0">
+                <a:latin typeface="Times New Roman" panose="02020603050405020304" pitchFamily="18" charset="0"/>
+                <a:cs typeface="Times New Roman" panose="02020603050405020304" pitchFamily="18" charset="0"/>
+              </a:rPr>
+              <a:t> game</a:t>
+            </a:r>
+          </a:p>
+        </p:txBody>
+      </p:sp>
+      <p:sp>
+        <p:nvSpPr>
+          <p:cNvPr id="7" name="TextBox 6">
+            <a:extLst>
+              <a:ext uri="{FF2B5EF4-FFF2-40B4-BE49-F238E27FC236}">
+                <a16:creationId xmlns:a16="http://schemas.microsoft.com/office/drawing/2014/main" id="{0ECA1A5C-CB10-F24D-9534-99C41C2319E3}"/>
+              </a:ext>
+            </a:extLst>
+          </p:cNvPr>
+          <p:cNvSpPr txBox="1"/>
+          <p:nvPr/>
+        </p:nvSpPr>
+        <p:spPr>
+          <a:xfrm>
+            <a:off x="537426" y="6092580"/>
+            <a:ext cx="8085762" cy="369332"/>
+          </a:xfrm>
+          <a:prstGeom prst="rect">
+            <a:avLst/>
+          </a:prstGeom>
+          <a:noFill/>
+        </p:spPr>
+        <p:txBody>
+          <a:bodyPr wrap="square" rtlCol="0">
+            <a:spAutoFit/>
+          </a:bodyPr>
+          <a:lstStyle/>
+          <a:p>
+            <a:pPr algn="ctr"/>
+            <a:r>
+              <a:rPr lang="en-US" dirty="0">
+                <a:latin typeface="Times New Roman" panose="02020603050405020304" pitchFamily="18" charset="0"/>
+                <a:cs typeface="Times New Roman" panose="02020603050405020304" pitchFamily="18" charset="0"/>
+              </a:rPr>
+              <a:t>Press F to see the previous page; press J to see the next page.</a:t>
+            </a:r>
+          </a:p>
+        </p:txBody>
+      </p:sp>
+      <p:pic>
+        <p:nvPicPr>
+          <p:cNvPr id="4" name="Picture 3">
+            <a:extLst>
+              <a:ext uri="{FF2B5EF4-FFF2-40B4-BE49-F238E27FC236}">
+                <a16:creationId xmlns:a16="http://schemas.microsoft.com/office/drawing/2014/main" id="{CE110F89-34D6-B314-6A6F-5372386718BC}"/>
+              </a:ext>
+            </a:extLst>
+          </p:cNvPr>
+          <p:cNvPicPr>
+            <a:picLocks noChangeAspect="1"/>
+          </p:cNvPicPr>
+          <p:nvPr/>
+        </p:nvPicPr>
+        <p:blipFill>
+          <a:blip r:embed="rId2"/>
+          <a:stretch>
+            <a:fillRect/>
+          </a:stretch>
+        </p:blipFill>
+        <p:spPr>
+          <a:xfrm>
+            <a:off x="2968997" y="2806213"/>
+            <a:ext cx="3147075" cy="3051419"/>
+          </a:xfrm>
+          <a:prstGeom prst="rect">
+            <a:avLst/>
+          </a:prstGeom>
+          <a:ln w="19050">
+            <a:solidFill>
+              <a:schemeClr val="tx1"/>
+            </a:solidFill>
+          </a:ln>
+        </p:spPr>
+      </p:pic>
+    </p:spTree>
+    <p:extLst>
+      <p:ext uri="{BB962C8B-B14F-4D97-AF65-F5344CB8AC3E}">
+        <p14:creationId xmlns:p14="http://schemas.microsoft.com/office/powerpoint/2010/main" val="696066352"/>
+      </p:ext>
+    </p:extLst>
+  </p:cSld>
+  <p:clrMapOvr>
+    <a:masterClrMapping/>
+  </p:clrMapOvr>
+</p:sld>
+</file>
+
+<file path=ppt/slides/slide13.xml><?xml version="1.0" encoding="utf-8"?>
+<p:sld xmlns:a="http://schemas.openxmlformats.org/drawingml/2006/main" xmlns:r="http://schemas.openxmlformats.org/officeDocument/2006/relationships" xmlns:p="http://schemas.openxmlformats.org/presentationml/2006/main">
+  <p:cSld>
+    <p:spTree>
+      <p:nvGrpSpPr>
+        <p:cNvPr id="1" name=""/>
+        <p:cNvGrpSpPr/>
+        <p:nvPr/>
+      </p:nvGrpSpPr>
+      <p:grpSpPr>
+        <a:xfrm>
+          <a:off x="0" y="0"/>
+          <a:ext cx="0" cy="0"/>
+          <a:chOff x="0" y="0"/>
+          <a:chExt cx="0" cy="0"/>
+        </a:xfrm>
+      </p:grpSpPr>
+      <p:sp>
+        <p:nvSpPr>
+          <p:cNvPr id="6" name="TextBox 5">
+            <a:extLst>
+              <a:ext uri="{FF2B5EF4-FFF2-40B4-BE49-F238E27FC236}">
+                <a16:creationId xmlns:a16="http://schemas.microsoft.com/office/drawing/2014/main" id="{3AA524FC-A232-7A41-9444-83383FE941EE}"/>
+              </a:ext>
+            </a:extLst>
+          </p:cNvPr>
+          <p:cNvSpPr txBox="1"/>
+          <p:nvPr/>
+        </p:nvSpPr>
+        <p:spPr>
+          <a:xfrm>
+            <a:off x="586529" y="322729"/>
+            <a:ext cx="7912012" cy="584775"/>
+          </a:xfrm>
+          <a:prstGeom prst="rect">
+            <a:avLst/>
+          </a:prstGeom>
+          <a:noFill/>
+        </p:spPr>
+        <p:txBody>
+          <a:bodyPr wrap="square" rtlCol="0">
+            <a:spAutoFit/>
+          </a:bodyPr>
+          <a:lstStyle/>
+          <a:p>
+            <a:pPr algn="ctr"/>
+            <a:r>
+              <a:rPr lang="en-BE" sz="3200" dirty="0">
+                <a:latin typeface="Times New Roman" panose="02020603050405020304" pitchFamily="18" charset="0"/>
+                <a:cs typeface="Times New Roman" panose="02020603050405020304" pitchFamily="18" charset="0"/>
+              </a:rPr>
+              <a:t>Rules of the </a:t>
+            </a:r>
+            <a:r>
+              <a:rPr lang="en-BE" sz="3200" b="1" dirty="0">
+                <a:latin typeface="Times New Roman" panose="02020603050405020304" pitchFamily="18" charset="0"/>
+                <a:cs typeface="Times New Roman" panose="02020603050405020304" pitchFamily="18" charset="0"/>
+              </a:rPr>
+              <a:t>choice</a:t>
+            </a:r>
+            <a:r>
+              <a:rPr lang="en-BE" sz="3200" dirty="0">
+                <a:latin typeface="Times New Roman" panose="02020603050405020304" pitchFamily="18" charset="0"/>
+                <a:cs typeface="Times New Roman" panose="02020603050405020304" pitchFamily="18" charset="0"/>
+              </a:rPr>
+              <a:t> game</a:t>
+            </a:r>
+          </a:p>
+        </p:txBody>
+      </p:sp>
+      <p:sp>
+        <p:nvSpPr>
+          <p:cNvPr id="7" name="TextBox 6">
+            <a:extLst>
+              <a:ext uri="{FF2B5EF4-FFF2-40B4-BE49-F238E27FC236}">
+                <a16:creationId xmlns:a16="http://schemas.microsoft.com/office/drawing/2014/main" id="{0ECA1A5C-CB10-F24D-9534-99C41C2319E3}"/>
+              </a:ext>
+            </a:extLst>
+          </p:cNvPr>
+          <p:cNvSpPr txBox="1"/>
+          <p:nvPr/>
+        </p:nvSpPr>
+        <p:spPr>
+          <a:xfrm>
+            <a:off x="537426" y="6092580"/>
+            <a:ext cx="8085762" cy="369332"/>
+          </a:xfrm>
+          <a:prstGeom prst="rect">
+            <a:avLst/>
+          </a:prstGeom>
+          <a:noFill/>
+        </p:spPr>
+        <p:txBody>
+          <a:bodyPr wrap="square" rtlCol="0">
+            <a:spAutoFit/>
+          </a:bodyPr>
+          <a:lstStyle/>
+          <a:p>
+            <a:pPr algn="ctr"/>
+            <a:r>
+              <a:rPr lang="en-US" dirty="0">
+                <a:latin typeface="Times New Roman" panose="02020603050405020304" pitchFamily="18" charset="0"/>
+                <a:cs typeface="Times New Roman" panose="02020603050405020304" pitchFamily="18" charset="0"/>
+              </a:rPr>
+              <a:t>Press F to see the previous page; press J to start Block 2.</a:t>
+            </a:r>
+          </a:p>
+        </p:txBody>
+      </p:sp>
+      <p:sp>
+        <p:nvSpPr>
+          <p:cNvPr id="3" name="TextBox 2">
+            <a:extLst>
+              <a:ext uri="{FF2B5EF4-FFF2-40B4-BE49-F238E27FC236}">
+                <a16:creationId xmlns:a16="http://schemas.microsoft.com/office/drawing/2014/main" id="{B54946AD-C3F2-A07E-B1ED-1A015C1168CF}"/>
+              </a:ext>
+            </a:extLst>
+          </p:cNvPr>
+          <p:cNvSpPr txBox="1"/>
+          <p:nvPr/>
+        </p:nvSpPr>
+        <p:spPr>
+          <a:xfrm>
+            <a:off x="586529" y="1864100"/>
+            <a:ext cx="8085762" cy="1477328"/>
+          </a:xfrm>
+          <a:prstGeom prst="rect">
+            <a:avLst/>
+          </a:prstGeom>
+          <a:noFill/>
+        </p:spPr>
+        <p:txBody>
+          <a:bodyPr wrap="square" rtlCol="0">
+            <a:spAutoFit/>
+          </a:bodyPr>
+          <a:lstStyle/>
+          <a:p>
+            <a:pPr algn="just"/>
+            <a:r>
+              <a:rPr lang="en-US" dirty="0">
+                <a:latin typeface="Times New Roman" panose="02020603050405020304" pitchFamily="18" charset="0"/>
+                <a:cs typeface="Times New Roman" panose="02020603050405020304" pitchFamily="18" charset="0"/>
+              </a:rPr>
+              <a:t>You will now receive 4 practice trials to get you familiar with the task.</a:t>
+            </a:r>
+          </a:p>
+          <a:p>
+            <a:pPr algn="just"/>
+            <a:endParaRPr lang="en-US" dirty="0">
+              <a:latin typeface="Times New Roman" panose="02020603050405020304" pitchFamily="18" charset="0"/>
+              <a:cs typeface="Times New Roman" panose="02020603050405020304" pitchFamily="18" charset="0"/>
+            </a:endParaRPr>
+          </a:p>
+          <a:p>
+            <a:pPr algn="just"/>
+            <a:r>
+              <a:rPr lang="en-US" dirty="0">
+                <a:latin typeface="Times New Roman" panose="02020603050405020304" pitchFamily="18" charset="0"/>
+                <a:cs typeface="Times New Roman" panose="02020603050405020304" pitchFamily="18" charset="0"/>
+              </a:rPr>
+              <a:t>If the rules are not clear to you, press F to read them again. </a:t>
+            </a:r>
+          </a:p>
+          <a:p>
+            <a:pPr algn="just"/>
+            <a:endParaRPr lang="en-US" dirty="0">
+              <a:latin typeface="Times New Roman" panose="02020603050405020304" pitchFamily="18" charset="0"/>
+              <a:cs typeface="Times New Roman" panose="02020603050405020304" pitchFamily="18" charset="0"/>
+            </a:endParaRPr>
+          </a:p>
+          <a:p>
+            <a:pPr algn="just"/>
+            <a:r>
+              <a:rPr lang="en-US" dirty="0">
+                <a:latin typeface="Times New Roman" panose="02020603050405020304" pitchFamily="18" charset="0"/>
+                <a:cs typeface="Times New Roman" panose="02020603050405020304" pitchFamily="18" charset="0"/>
+              </a:rPr>
+              <a:t>If everything is clear, press J to start Block 2.</a:t>
+            </a:r>
+          </a:p>
+        </p:txBody>
+      </p:sp>
+    </p:spTree>
+    <p:extLst>
+      <p:ext uri="{BB962C8B-B14F-4D97-AF65-F5344CB8AC3E}">
+        <p14:creationId xmlns:p14="http://schemas.microsoft.com/office/powerpoint/2010/main" val="3986448168"/>
+      </p:ext>
+    </p:extLst>
+  </p:cSld>
+  <p:clrMapOvr>
+    <a:masterClrMapping/>
+  </p:clrMapOvr>
+</p:sld>
+</file>
+
+<file path=ppt/slides/slide14.xml><?xml version="1.0" encoding="utf-8"?>
+<p:sld xmlns:a="http://schemas.openxmlformats.org/drawingml/2006/main" xmlns:r="http://schemas.openxmlformats.org/officeDocument/2006/relationships" xmlns:p="http://schemas.openxmlformats.org/presentationml/2006/main">
+  <p:cSld>
+    <p:spTree>
+      <p:nvGrpSpPr>
+        <p:cNvPr id="1" name=""/>
+        <p:cNvGrpSpPr/>
+        <p:nvPr/>
+      </p:nvGrpSpPr>
+      <p:grpSpPr>
+        <a:xfrm>
+          <a:off x="0" y="0"/>
+          <a:ext cx="0" cy="0"/>
+          <a:chOff x="0" y="0"/>
+          <a:chExt cx="0" cy="0"/>
+        </a:xfrm>
+      </p:grpSpPr>
+      <p:sp>
+        <p:nvSpPr>
+          <p:cNvPr id="4" name="TextBox 3">
+            <a:extLst>
+              <a:ext uri="{FF2B5EF4-FFF2-40B4-BE49-F238E27FC236}">
+                <a16:creationId xmlns:a16="http://schemas.microsoft.com/office/drawing/2014/main" id="{DDB96637-E5C7-1A4A-9705-F6FAAB57C2D9}"/>
+              </a:ext>
+            </a:extLst>
+          </p:cNvPr>
+          <p:cNvSpPr txBox="1"/>
+          <p:nvPr/>
+        </p:nvSpPr>
+        <p:spPr>
+          <a:xfrm>
+            <a:off x="529119" y="763897"/>
+            <a:ext cx="8085762" cy="5355312"/>
+          </a:xfrm>
+          <a:prstGeom prst="rect">
+            <a:avLst/>
+          </a:prstGeom>
+          <a:noFill/>
+        </p:spPr>
+        <p:txBody>
+          <a:bodyPr wrap="square" rtlCol="0">
+            <a:spAutoFit/>
+          </a:bodyPr>
+          <a:lstStyle/>
+          <a:p>
+            <a:pPr algn="just"/>
+            <a:r>
+              <a:rPr lang="en-US" dirty="0">
+                <a:latin typeface="Times New Roman" panose="02020603050405020304" pitchFamily="18" charset="0"/>
+                <a:cs typeface="Times New Roman" panose="02020603050405020304" pitchFamily="18" charset="0"/>
+              </a:rPr>
+              <a:t>Time for the experimental blocks!</a:t>
+            </a:r>
+          </a:p>
+          <a:p>
+            <a:pPr algn="just"/>
+            <a:endParaRPr lang="en-US" dirty="0">
+              <a:latin typeface="Times New Roman" panose="02020603050405020304" pitchFamily="18" charset="0"/>
+              <a:cs typeface="Times New Roman" panose="02020603050405020304" pitchFamily="18" charset="0"/>
+            </a:endParaRPr>
+          </a:p>
+          <a:p>
+            <a:pPr algn="just"/>
+            <a:r>
+              <a:rPr lang="en-US" dirty="0">
+                <a:latin typeface="Times New Roman" panose="02020603050405020304" pitchFamily="18" charset="0"/>
+                <a:cs typeface="Times New Roman" panose="02020603050405020304" pitchFamily="18" charset="0"/>
+              </a:rPr>
+              <a:t>You are going to alternate between the </a:t>
+            </a:r>
+            <a:r>
+              <a:rPr lang="en-US" b="1" dirty="0">
+                <a:latin typeface="Times New Roman" panose="02020603050405020304" pitchFamily="18" charset="0"/>
+                <a:cs typeface="Times New Roman" panose="02020603050405020304" pitchFamily="18" charset="0"/>
+              </a:rPr>
+              <a:t>guessing</a:t>
+            </a:r>
+            <a:r>
+              <a:rPr lang="en-US" dirty="0">
+                <a:latin typeface="Times New Roman" panose="02020603050405020304" pitchFamily="18" charset="0"/>
+                <a:cs typeface="Times New Roman" panose="02020603050405020304" pitchFamily="18" charset="0"/>
+              </a:rPr>
+              <a:t> game and the </a:t>
+            </a:r>
+            <a:r>
+              <a:rPr lang="en-US" b="1" dirty="0">
+                <a:latin typeface="Times New Roman" panose="02020603050405020304" pitchFamily="18" charset="0"/>
+                <a:cs typeface="Times New Roman" panose="02020603050405020304" pitchFamily="18" charset="0"/>
+              </a:rPr>
+              <a:t>choice</a:t>
+            </a:r>
+            <a:r>
+              <a:rPr lang="en-US" dirty="0">
+                <a:latin typeface="Times New Roman" panose="02020603050405020304" pitchFamily="18" charset="0"/>
+                <a:cs typeface="Times New Roman" panose="02020603050405020304" pitchFamily="18" charset="0"/>
+              </a:rPr>
+              <a:t> game. We have included 4 blocks, and each block includes 50 games (4 minutes per block). After finishing each block, you can take a short break if needed.</a:t>
+            </a:r>
+          </a:p>
+          <a:p>
+            <a:pPr algn="just"/>
+            <a:endParaRPr lang="en-US" dirty="0">
+              <a:latin typeface="Times New Roman" panose="02020603050405020304" pitchFamily="18" charset="0"/>
+              <a:cs typeface="Times New Roman" panose="02020603050405020304" pitchFamily="18" charset="0"/>
+            </a:endParaRPr>
+          </a:p>
+          <a:p>
+            <a:pPr algn="just"/>
+            <a:r>
+              <a:rPr lang="en-US" dirty="0">
+                <a:latin typeface="Times New Roman" panose="02020603050405020304" pitchFamily="18" charset="0"/>
+                <a:cs typeface="Times New Roman" panose="02020603050405020304" pitchFamily="18" charset="0"/>
+              </a:rPr>
+              <a:t>At the end of the experiment, we will randomly pick 4 guessing games and 4 choice games. The money that you have win or lost on </a:t>
+            </a:r>
+            <a:r>
+              <a:rPr lang="en-US">
+                <a:latin typeface="Times New Roman" panose="02020603050405020304" pitchFamily="18" charset="0"/>
+                <a:cs typeface="Times New Roman" panose="02020603050405020304" pitchFamily="18" charset="0"/>
+              </a:rPr>
+              <a:t>these 8 </a:t>
+            </a:r>
+            <a:r>
+              <a:rPr lang="en-US" dirty="0">
+                <a:latin typeface="Times New Roman" panose="02020603050405020304" pitchFamily="18" charset="0"/>
+                <a:cs typeface="Times New Roman" panose="02020603050405020304" pitchFamily="18" charset="0"/>
+              </a:rPr>
+              <a:t>games will be added up and paid to you as an extra bonus (maximum 1 British pound). If you end up with 0 and a negative number, then you won’t get an extra bonus. Since you don’t know which four games will be picked, your best strategy is to </a:t>
+            </a:r>
+            <a:r>
+              <a:rPr lang="en-US" b="1" dirty="0">
+                <a:latin typeface="Times New Roman" panose="02020603050405020304" pitchFamily="18" charset="0"/>
+                <a:cs typeface="Times New Roman" panose="02020603050405020304" pitchFamily="18" charset="0"/>
+              </a:rPr>
+              <a:t>treat each game as if it is the only one that counts.</a:t>
+            </a:r>
+          </a:p>
+          <a:p>
+            <a:pPr algn="just"/>
+            <a:endParaRPr lang="en-US" dirty="0">
+              <a:latin typeface="Times New Roman" panose="02020603050405020304" pitchFamily="18" charset="0"/>
+              <a:cs typeface="Times New Roman" panose="02020603050405020304" pitchFamily="18" charset="0"/>
+            </a:endParaRPr>
+          </a:p>
+          <a:p>
+            <a:pPr algn="just"/>
+            <a:endParaRPr lang="en-US" dirty="0">
+              <a:latin typeface="Times New Roman" panose="02020603050405020304" pitchFamily="18" charset="0"/>
+              <a:cs typeface="Times New Roman" panose="02020603050405020304" pitchFamily="18" charset="0"/>
+            </a:endParaRPr>
+          </a:p>
+          <a:p>
+            <a:pPr algn="just"/>
+            <a:r>
+              <a:rPr lang="en-US" dirty="0">
+                <a:latin typeface="Times New Roman" panose="02020603050405020304" pitchFamily="18" charset="0"/>
+                <a:cs typeface="Times New Roman" panose="02020603050405020304" pitchFamily="18" charset="0"/>
+              </a:rPr>
+              <a:t>Press J to start the experimental blocks. Good luck!</a:t>
+            </a:r>
+          </a:p>
+          <a:p>
+            <a:pPr algn="just"/>
+            <a:endParaRPr lang="en-US" dirty="0">
+              <a:latin typeface="Times New Roman" panose="02020603050405020304" pitchFamily="18" charset="0"/>
+              <a:cs typeface="Times New Roman" panose="02020603050405020304" pitchFamily="18" charset="0"/>
+            </a:endParaRPr>
+          </a:p>
+          <a:p>
+            <a:pPr algn="just"/>
+            <a:endParaRPr lang="en-US" b="1" dirty="0">
+              <a:latin typeface="Times New Roman" panose="02020603050405020304" pitchFamily="18" charset="0"/>
+              <a:cs typeface="Times New Roman" panose="02020603050405020304" pitchFamily="18" charset="0"/>
+            </a:endParaRPr>
+          </a:p>
+          <a:p>
+            <a:pPr algn="just"/>
+            <a:r>
+              <a:rPr lang="en-US" b="1" dirty="0">
+                <a:latin typeface="Times New Roman" panose="02020603050405020304" pitchFamily="18" charset="0"/>
+                <a:cs typeface="Times New Roman" panose="02020603050405020304" pitchFamily="18" charset="0"/>
+              </a:rPr>
+              <a:t>IMPORTANT: Do not refresh the page during the experiment. Refreshing the page will restart the experiment from the beginning.</a:t>
+            </a:r>
+          </a:p>
+        </p:txBody>
+      </p:sp>
+    </p:spTree>
+    <p:extLst>
+      <p:ext uri="{BB962C8B-B14F-4D97-AF65-F5344CB8AC3E}">
+        <p14:creationId xmlns:p14="http://schemas.microsoft.com/office/powerpoint/2010/main" val="1988374102"/>
+      </p:ext>
+    </p:extLst>
+  </p:cSld>
+  <p:clrMapOvr>
+    <a:masterClrMapping/>
+  </p:clrMapOvr>
+</p:sld>
+</file>
+
+<file path=ppt/slides/slide15.xml><?xml version="1.0" encoding="utf-8"?>
+<p:sld xmlns:a="http://schemas.openxmlformats.org/drawingml/2006/main" xmlns:r="http://schemas.openxmlformats.org/officeDocument/2006/relationships" xmlns:p="http://schemas.openxmlformats.org/presentationml/2006/main">
+  <p:cSld>
+    <p:spTree>
+      <p:nvGrpSpPr>
+        <p:cNvPr id="1" name=""/>
+        <p:cNvGrpSpPr/>
+        <p:nvPr/>
+      </p:nvGrpSpPr>
+      <p:grpSpPr>
+        <a:xfrm>
+          <a:off x="0" y="0"/>
+          <a:ext cx="0" cy="0"/>
+          <a:chOff x="0" y="0"/>
+          <a:chExt cx="0" cy="0"/>
+        </a:xfrm>
+      </p:grpSpPr>
+      <p:sp>
+        <p:nvSpPr>
           <p:cNvPr id="8" name="TextBox 7">
             <a:extLst>
               <a:ext uri="{FF2B5EF4-FFF2-40B4-BE49-F238E27FC236}">
@@ -4288,8 +5011,8 @@
         </p:nvSpPr>
         <p:spPr>
           <a:xfrm>
-            <a:off x="537426" y="2134039"/>
-            <a:ext cx="8085762" cy="1477328"/>
+            <a:off x="529119" y="2071771"/>
+            <a:ext cx="8085762" cy="1200329"/>
           </a:xfrm>
           <a:prstGeom prst="rect">
             <a:avLst/>
@@ -4308,222 +5031,17 @@
                 <a:latin typeface="Times New Roman" panose="02020603050405020304" pitchFamily="18" charset="0"/>
                 <a:cs typeface="Times New Roman" panose="02020603050405020304" pitchFamily="18" charset="0"/>
               </a:rPr>
-              <a:t>In this last task, you will see 20 statements that describe ways in which people act and think. For each statement, please indicate how much you agree or disagree with the statement, by selecting Agree Strongly, Agree Somewhat, Disagree Somewhat or Disagree Strongly. Be sure to indicate your agreement or disagreement for every statement.</a:t>
-            </a:r>
-          </a:p>
-        </p:txBody>
-      </p:sp>
-      <p:grpSp>
-        <p:nvGrpSpPr>
-          <p:cNvPr id="11" name="Group 10">
-            <a:extLst>
-              <a:ext uri="{FF2B5EF4-FFF2-40B4-BE49-F238E27FC236}">
-                <a16:creationId xmlns:a16="http://schemas.microsoft.com/office/drawing/2014/main" id="{ED91590A-8C30-FE47-959D-4EC9E6155D48}"/>
-              </a:ext>
-            </a:extLst>
-          </p:cNvPr>
-          <p:cNvGrpSpPr/>
-          <p:nvPr/>
-        </p:nvGrpSpPr>
-        <p:grpSpPr>
-          <a:xfrm>
-            <a:off x="701139" y="699848"/>
-            <a:ext cx="7741722" cy="430306"/>
-            <a:chOff x="-12991" y="1317811"/>
-            <a:chExt cx="7741722" cy="430306"/>
-          </a:xfrm>
-        </p:grpSpPr>
-        <p:sp>
-          <p:nvSpPr>
-            <p:cNvPr id="12" name="Rectangle 11">
-              <a:extLst>
-                <a:ext uri="{FF2B5EF4-FFF2-40B4-BE49-F238E27FC236}">
-                  <a16:creationId xmlns:a16="http://schemas.microsoft.com/office/drawing/2014/main" id="{EDCD3EC6-B3E5-8D4C-8805-C2A14D5A933D}"/>
-                </a:ext>
-              </a:extLst>
-            </p:cNvPr>
-            <p:cNvSpPr/>
-            <p:nvPr/>
-          </p:nvSpPr>
-          <p:spPr>
-            <a:xfrm>
-              <a:off x="-12991" y="1317811"/>
-              <a:ext cx="5741438" cy="430306"/>
-            </a:xfrm>
-            <a:prstGeom prst="rect">
-              <a:avLst/>
-            </a:prstGeom>
-            <a:solidFill>
-              <a:schemeClr val="bg1">
-                <a:lumMod val="75000"/>
-              </a:schemeClr>
-            </a:solidFill>
-            <a:ln w="25400">
-              <a:solidFill>
-                <a:schemeClr val="tx1"/>
-              </a:solidFill>
-            </a:ln>
-            <a:effectLst/>
-          </p:spPr>
-          <p:style>
-            <a:lnRef idx="1">
-              <a:schemeClr val="accent1"/>
-            </a:lnRef>
-            <a:fillRef idx="3">
-              <a:schemeClr val="accent1"/>
-            </a:fillRef>
-            <a:effectRef idx="2">
-              <a:schemeClr val="accent1"/>
-            </a:effectRef>
-            <a:fontRef idx="minor">
-              <a:schemeClr val="lt1"/>
-            </a:fontRef>
-          </p:style>
-          <p:txBody>
-            <a:bodyPr rtlCol="0" anchor="ctr"/>
-            <a:lstStyle/>
-            <a:p>
-              <a:pPr algn="ctr"/>
-              <a:r>
-                <a:rPr lang="en-BE" dirty="0">
-                  <a:solidFill>
-                    <a:schemeClr val="tx1"/>
-                  </a:solidFill>
-                </a:rPr>
-                <a:t>1</a:t>
-              </a:r>
-            </a:p>
-          </p:txBody>
-        </p:sp>
-        <p:sp>
-          <p:nvSpPr>
-            <p:cNvPr id="13" name="Rectangle 12">
-              <a:extLst>
-                <a:ext uri="{FF2B5EF4-FFF2-40B4-BE49-F238E27FC236}">
-                  <a16:creationId xmlns:a16="http://schemas.microsoft.com/office/drawing/2014/main" id="{7819FED7-AFC5-5643-9AC4-E4D23A096D3D}"/>
-                </a:ext>
-              </a:extLst>
-            </p:cNvPr>
-            <p:cNvSpPr/>
-            <p:nvPr/>
-          </p:nvSpPr>
-          <p:spPr>
-            <a:xfrm>
-              <a:off x="5728447" y="1317811"/>
-              <a:ext cx="819815" cy="430306"/>
-            </a:xfrm>
-            <a:prstGeom prst="rect">
-              <a:avLst/>
-            </a:prstGeom>
-            <a:solidFill>
-              <a:schemeClr val="bg1">
-                <a:lumMod val="75000"/>
-              </a:schemeClr>
-            </a:solidFill>
-            <a:ln w="25400">
-              <a:solidFill>
-                <a:schemeClr val="tx1"/>
-              </a:solidFill>
-            </a:ln>
-            <a:effectLst/>
-          </p:spPr>
-          <p:style>
-            <a:lnRef idx="1">
-              <a:schemeClr val="accent1"/>
-            </a:lnRef>
-            <a:fillRef idx="3">
-              <a:schemeClr val="accent1"/>
-            </a:fillRef>
-            <a:effectRef idx="2">
-              <a:schemeClr val="accent1"/>
-            </a:effectRef>
-            <a:fontRef idx="minor">
-              <a:schemeClr val="lt1"/>
-            </a:fontRef>
-          </p:style>
-          <p:txBody>
-            <a:bodyPr rtlCol="0" anchor="ctr"/>
-            <a:lstStyle/>
-            <a:p>
-              <a:pPr algn="ctr"/>
-              <a:r>
-                <a:rPr lang="en-BE" dirty="0">
-                  <a:solidFill>
-                    <a:schemeClr val="tx1"/>
-                  </a:solidFill>
-                </a:rPr>
-                <a:t>2</a:t>
-              </a:r>
-            </a:p>
-          </p:txBody>
-        </p:sp>
-        <p:sp>
-          <p:nvSpPr>
-            <p:cNvPr id="14" name="Rectangle 13">
-              <a:extLst>
-                <a:ext uri="{FF2B5EF4-FFF2-40B4-BE49-F238E27FC236}">
-                  <a16:creationId xmlns:a16="http://schemas.microsoft.com/office/drawing/2014/main" id="{32BB886D-F5CA-654E-81A8-909FAD8334B6}"/>
-                </a:ext>
-              </a:extLst>
-            </p:cNvPr>
-            <p:cNvSpPr/>
-            <p:nvPr/>
-          </p:nvSpPr>
-          <p:spPr>
-            <a:xfrm>
-              <a:off x="6548262" y="1317811"/>
-              <a:ext cx="1180469" cy="430306"/>
-            </a:xfrm>
-            <a:prstGeom prst="rect">
-              <a:avLst/>
-            </a:prstGeom>
-            <a:solidFill>
-              <a:srgbClr val="00B050"/>
-            </a:solidFill>
-            <a:ln w="25400">
-              <a:solidFill>
-                <a:schemeClr val="tx1"/>
-              </a:solidFill>
-            </a:ln>
-            <a:effectLst/>
-          </p:spPr>
-          <p:style>
-            <a:lnRef idx="1">
-              <a:schemeClr val="accent1"/>
-            </a:lnRef>
-            <a:fillRef idx="3">
-              <a:schemeClr val="accent1"/>
-            </a:fillRef>
-            <a:effectRef idx="2">
-              <a:schemeClr val="accent1"/>
-            </a:effectRef>
-            <a:fontRef idx="minor">
-              <a:schemeClr val="lt1"/>
-            </a:fontRef>
-          </p:style>
-          <p:txBody>
-            <a:bodyPr rtlCol="0" anchor="ctr"/>
-            <a:lstStyle/>
-            <a:p>
-              <a:pPr algn="ctr"/>
-              <a:r>
-                <a:rPr lang="en-BE" dirty="0">
-                  <a:solidFill>
-                    <a:schemeClr val="tx1"/>
-                  </a:solidFill>
-                </a:rPr>
-                <a:t>3</a:t>
-              </a:r>
-            </a:p>
-          </p:txBody>
-        </p:sp>
-      </p:grpSp>
+              <a:t>In this last part, you will see 9 questions about your past experiences with gambling. For each question, indicate how often the situation described in the question has occurred to you, by selecting Never, Sometimes, Most of the time or Almost always. You will use the computer mouse or the touchpad to answer these questions.</a:t>
+            </a:r>
+          </a:p>
+        </p:txBody>
+      </p:sp>
       <p:sp>
         <p:nvSpPr>
           <p:cNvPr id="15" name="TextBox 14">
             <a:extLst>
               <a:ext uri="{FF2B5EF4-FFF2-40B4-BE49-F238E27FC236}">
-                <a16:creationId xmlns:a16="http://schemas.microsoft.com/office/drawing/2014/main" id="{35F4AF07-4B36-564A-BF81-7A7238C41817}"/>
+                <a16:creationId xmlns:a16="http://schemas.microsoft.com/office/drawing/2014/main" id="{9E7A20CA-0632-4F4D-9AFF-C65AC72697AC}"/>
               </a:ext>
             </a:extLst>
           </p:cNvPr>
@@ -4560,7 +5078,7 @@
     </p:spTree>
     <p:extLst>
       <p:ext uri="{BB962C8B-B14F-4D97-AF65-F5344CB8AC3E}">
-        <p14:creationId xmlns:p14="http://schemas.microsoft.com/office/powerpoint/2010/main" val="1604323939"/>
+        <p14:creationId xmlns:p14="http://schemas.microsoft.com/office/powerpoint/2010/main" val="68709908"/>
       </p:ext>
     </p:extLst>
   </p:cSld>
@@ -4601,8 +5119,8 @@
         </p:nvSpPr>
         <p:spPr>
           <a:xfrm>
-            <a:off x="537426" y="2251973"/>
-            <a:ext cx="8085762" cy="2031325"/>
+            <a:off x="520812" y="786000"/>
+            <a:ext cx="8085762" cy="1477328"/>
           </a:xfrm>
           <a:prstGeom prst="rect">
             <a:avLst/>
@@ -4621,7 +5139,7 @@
                 <a:latin typeface="Times New Roman" panose="02020603050405020304" pitchFamily="18" charset="0"/>
                 <a:cs typeface="Times New Roman" panose="02020603050405020304" pitchFamily="18" charset="0"/>
               </a:rPr>
-              <a:t>Welcome! In this experiment, you will play two simple games, and then answer some questions. The whole experiment will take around 35 minutes. The progress bar above shows you which task you are currently doing.</a:t>
+              <a:t>Welcome! In this experiment, you will play a simple wheel of fortune game. The whole experiment will take around 23 minutes. </a:t>
             </a:r>
           </a:p>
           <a:p>
@@ -4633,336 +5151,12 @@
           </a:p>
           <a:p>
             <a:pPr algn="just"/>
-            <a:endParaRPr lang="en-US" dirty="0">
-              <a:latin typeface="Times New Roman" panose="02020603050405020304" pitchFamily="18" charset="0"/>
-              <a:cs typeface="Times New Roman" panose="02020603050405020304" pitchFamily="18" charset="0"/>
-            </a:endParaRPr>
-          </a:p>
-          <a:p>
-            <a:pPr algn="just"/>
-            <a:r>
-              <a:rPr lang="en-US" b="1" dirty="0">
-                <a:latin typeface="Times New Roman" panose="02020603050405020304" pitchFamily="18" charset="0"/>
-                <a:cs typeface="Times New Roman" panose="02020603050405020304" pitchFamily="18" charset="0"/>
-              </a:rPr>
-              <a:t>IMPORTANT: Do not refresh the page during the experiment. Refreshing the page will restart the experiment from the beginning.</a:t>
-            </a:r>
-            <a:endParaRPr lang="en-US" dirty="0">
-              <a:latin typeface="Times New Roman" panose="02020603050405020304" pitchFamily="18" charset="0"/>
-              <a:cs typeface="Times New Roman" panose="02020603050405020304" pitchFamily="18" charset="0"/>
-            </a:endParaRPr>
-          </a:p>
-        </p:txBody>
-      </p:sp>
-      <p:grpSp>
-        <p:nvGrpSpPr>
-          <p:cNvPr id="10" name="Group 9">
-            <a:extLst>
-              <a:ext uri="{FF2B5EF4-FFF2-40B4-BE49-F238E27FC236}">
-                <a16:creationId xmlns:a16="http://schemas.microsoft.com/office/drawing/2014/main" id="{1C191675-CF72-A243-B681-A01A24D7A5CE}"/>
-              </a:ext>
-            </a:extLst>
-          </p:cNvPr>
-          <p:cNvGrpSpPr/>
-          <p:nvPr/>
-        </p:nvGrpSpPr>
-        <p:grpSpPr>
-          <a:xfrm>
-            <a:off x="701139" y="699848"/>
-            <a:ext cx="7741722" cy="430306"/>
-            <a:chOff x="-12991" y="1317811"/>
-            <a:chExt cx="7741722" cy="430306"/>
-          </a:xfrm>
-        </p:grpSpPr>
-        <p:sp>
-          <p:nvSpPr>
-            <p:cNvPr id="16" name="Rectangle 15">
-              <a:extLst>
-                <a:ext uri="{FF2B5EF4-FFF2-40B4-BE49-F238E27FC236}">
-                  <a16:creationId xmlns:a16="http://schemas.microsoft.com/office/drawing/2014/main" id="{8E8F5BBB-592F-314D-9D9D-7D758FC9A595}"/>
-                </a:ext>
-              </a:extLst>
-            </p:cNvPr>
-            <p:cNvSpPr/>
-            <p:nvPr/>
-          </p:nvSpPr>
-          <p:spPr>
-            <a:xfrm>
-              <a:off x="-12991" y="1317811"/>
-              <a:ext cx="5741438" cy="430306"/>
-            </a:xfrm>
-            <a:prstGeom prst="rect">
-              <a:avLst/>
-            </a:prstGeom>
-            <a:solidFill>
-              <a:srgbClr val="00B050"/>
-            </a:solidFill>
-            <a:ln w="25400">
-              <a:solidFill>
-                <a:schemeClr val="tx1"/>
-              </a:solidFill>
-            </a:ln>
-            <a:effectLst/>
-          </p:spPr>
-          <p:style>
-            <a:lnRef idx="1">
-              <a:schemeClr val="accent1"/>
-            </a:lnRef>
-            <a:fillRef idx="3">
-              <a:schemeClr val="accent1"/>
-            </a:fillRef>
-            <a:effectRef idx="2">
-              <a:schemeClr val="accent1"/>
-            </a:effectRef>
-            <a:fontRef idx="minor">
-              <a:schemeClr val="lt1"/>
-            </a:fontRef>
-          </p:style>
-          <p:txBody>
-            <a:bodyPr rtlCol="0" anchor="ctr"/>
-            <a:lstStyle/>
-            <a:p>
-              <a:pPr algn="ctr"/>
-              <a:r>
-                <a:rPr lang="en-BE" dirty="0">
-                  <a:solidFill>
-                    <a:schemeClr val="tx1"/>
-                  </a:solidFill>
-                </a:rPr>
-                <a:t>1</a:t>
-              </a:r>
-            </a:p>
-          </p:txBody>
-        </p:sp>
-        <p:sp>
-          <p:nvSpPr>
-            <p:cNvPr id="17" name="Rectangle 16">
-              <a:extLst>
-                <a:ext uri="{FF2B5EF4-FFF2-40B4-BE49-F238E27FC236}">
-                  <a16:creationId xmlns:a16="http://schemas.microsoft.com/office/drawing/2014/main" id="{46D549D8-9A6A-2E41-A6EC-C88D5A897FCC}"/>
-                </a:ext>
-              </a:extLst>
-            </p:cNvPr>
-            <p:cNvSpPr/>
-            <p:nvPr/>
-          </p:nvSpPr>
-          <p:spPr>
-            <a:xfrm>
-              <a:off x="5728447" y="1317811"/>
-              <a:ext cx="819815" cy="430306"/>
-            </a:xfrm>
-            <a:prstGeom prst="rect">
-              <a:avLst/>
-            </a:prstGeom>
-            <a:solidFill>
-              <a:schemeClr val="bg1">
-                <a:lumMod val="75000"/>
-              </a:schemeClr>
-            </a:solidFill>
-            <a:ln w="25400">
-              <a:solidFill>
-                <a:schemeClr val="tx1"/>
-              </a:solidFill>
-            </a:ln>
-            <a:effectLst/>
-          </p:spPr>
-          <p:style>
-            <a:lnRef idx="1">
-              <a:schemeClr val="accent1"/>
-            </a:lnRef>
-            <a:fillRef idx="3">
-              <a:schemeClr val="accent1"/>
-            </a:fillRef>
-            <a:effectRef idx="2">
-              <a:schemeClr val="accent1"/>
-            </a:effectRef>
-            <a:fontRef idx="minor">
-              <a:schemeClr val="lt1"/>
-            </a:fontRef>
-          </p:style>
-          <p:txBody>
-            <a:bodyPr rtlCol="0" anchor="ctr"/>
-            <a:lstStyle/>
-            <a:p>
-              <a:pPr algn="ctr"/>
-              <a:r>
-                <a:rPr lang="en-BE" dirty="0">
-                  <a:solidFill>
-                    <a:schemeClr val="tx1"/>
-                  </a:solidFill>
-                </a:rPr>
-                <a:t>2</a:t>
-              </a:r>
-            </a:p>
-          </p:txBody>
-        </p:sp>
-        <p:sp>
-          <p:nvSpPr>
-            <p:cNvPr id="18" name="Rectangle 17">
-              <a:extLst>
-                <a:ext uri="{FF2B5EF4-FFF2-40B4-BE49-F238E27FC236}">
-                  <a16:creationId xmlns:a16="http://schemas.microsoft.com/office/drawing/2014/main" id="{E52F722D-A3E8-094F-AC91-B26F7BDCB898}"/>
-                </a:ext>
-              </a:extLst>
-            </p:cNvPr>
-            <p:cNvSpPr/>
-            <p:nvPr/>
-          </p:nvSpPr>
-          <p:spPr>
-            <a:xfrm>
-              <a:off x="6548262" y="1317811"/>
-              <a:ext cx="1180469" cy="430306"/>
-            </a:xfrm>
-            <a:prstGeom prst="rect">
-              <a:avLst/>
-            </a:prstGeom>
-            <a:solidFill>
-              <a:schemeClr val="bg1">
-                <a:lumMod val="75000"/>
-              </a:schemeClr>
-            </a:solidFill>
-            <a:ln w="25400">
-              <a:solidFill>
-                <a:schemeClr val="tx1"/>
-              </a:solidFill>
-            </a:ln>
-            <a:effectLst/>
-          </p:spPr>
-          <p:style>
-            <a:lnRef idx="1">
-              <a:schemeClr val="accent1"/>
-            </a:lnRef>
-            <a:fillRef idx="3">
-              <a:schemeClr val="accent1"/>
-            </a:fillRef>
-            <a:effectRef idx="2">
-              <a:schemeClr val="accent1"/>
-            </a:effectRef>
-            <a:fontRef idx="minor">
-              <a:schemeClr val="lt1"/>
-            </a:fontRef>
-          </p:style>
-          <p:txBody>
-            <a:bodyPr rtlCol="0" anchor="ctr"/>
-            <a:lstStyle/>
-            <a:p>
-              <a:pPr algn="ctr"/>
-              <a:r>
-                <a:rPr lang="en-BE" dirty="0">
-                  <a:solidFill>
-                    <a:schemeClr val="tx1"/>
-                  </a:solidFill>
-                </a:rPr>
-                <a:t>3</a:t>
-              </a:r>
-            </a:p>
-          </p:txBody>
-        </p:sp>
-      </p:grpSp>
-      <p:sp>
-        <p:nvSpPr>
-          <p:cNvPr id="22" name="TextBox 21">
-            <a:extLst>
-              <a:ext uri="{FF2B5EF4-FFF2-40B4-BE49-F238E27FC236}">
-                <a16:creationId xmlns:a16="http://schemas.microsoft.com/office/drawing/2014/main" id="{1154942E-8703-D949-AECB-50C5E8BAFF77}"/>
-              </a:ext>
-            </a:extLst>
-          </p:cNvPr>
-          <p:cNvSpPr txBox="1"/>
-          <p:nvPr/>
-        </p:nvSpPr>
-        <p:spPr>
-          <a:xfrm>
-            <a:off x="537426" y="6092580"/>
-            <a:ext cx="8085762" cy="369332"/>
-          </a:xfrm>
-          <a:prstGeom prst="rect">
-            <a:avLst/>
-          </a:prstGeom>
-          <a:noFill/>
-        </p:spPr>
-        <p:txBody>
-          <a:bodyPr wrap="square" rtlCol="0">
-            <a:spAutoFit/>
-          </a:bodyPr>
-          <a:lstStyle/>
-          <a:p>
-            <a:pPr algn="ctr"/>
             <a:r>
               <a:rPr lang="en-US" dirty="0">
                 <a:latin typeface="Times New Roman" panose="02020603050405020304" pitchFamily="18" charset="0"/>
                 <a:cs typeface="Times New Roman" panose="02020603050405020304" pitchFamily="18" charset="0"/>
               </a:rPr>
-              <a:t>Press J to see the next page.</a:t>
-            </a:r>
-          </a:p>
-        </p:txBody>
-      </p:sp>
-    </p:spTree>
-    <p:extLst>
-      <p:ext uri="{BB962C8B-B14F-4D97-AF65-F5344CB8AC3E}">
-        <p14:creationId xmlns:p14="http://schemas.microsoft.com/office/powerpoint/2010/main" val="2682630363"/>
-      </p:ext>
-    </p:extLst>
-  </p:cSld>
-  <p:clrMapOvr>
-    <a:masterClrMapping/>
-  </p:clrMapOvr>
-</p:sld>
-</file>
-
-<file path=ppt/slides/slide3.xml><?xml version="1.0" encoding="utf-8"?>
-<p:sld xmlns:a="http://schemas.openxmlformats.org/drawingml/2006/main" xmlns:r="http://schemas.openxmlformats.org/officeDocument/2006/relationships" xmlns:p="http://schemas.openxmlformats.org/presentationml/2006/main">
-  <p:cSld>
-    <p:spTree>
-      <p:nvGrpSpPr>
-        <p:cNvPr id="1" name=""/>
-        <p:cNvGrpSpPr/>
-        <p:nvPr/>
-      </p:nvGrpSpPr>
-      <p:grpSpPr>
-        <a:xfrm>
-          <a:off x="0" y="0"/>
-          <a:ext cx="0" cy="0"/>
-          <a:chOff x="0" y="0"/>
-          <a:chExt cx="0" cy="0"/>
-        </a:xfrm>
-      </p:grpSpPr>
-      <p:sp>
-        <p:nvSpPr>
-          <p:cNvPr id="8" name="TextBox 7">
-            <a:extLst>
-              <a:ext uri="{FF2B5EF4-FFF2-40B4-BE49-F238E27FC236}">
-                <a16:creationId xmlns:a16="http://schemas.microsoft.com/office/drawing/2014/main" id="{974770A9-F67D-D541-AF45-2EF49C92E356}"/>
-              </a:ext>
-            </a:extLst>
-          </p:cNvPr>
-          <p:cNvSpPr txBox="1"/>
-          <p:nvPr/>
-        </p:nvSpPr>
-        <p:spPr>
-          <a:xfrm>
-            <a:off x="537426" y="1468440"/>
-            <a:ext cx="8085762" cy="923330"/>
-          </a:xfrm>
-          <a:prstGeom prst="rect">
-            <a:avLst/>
-          </a:prstGeom>
-          <a:noFill/>
-        </p:spPr>
-        <p:txBody>
-          <a:bodyPr wrap="square" rtlCol="0">
-            <a:spAutoFit/>
-          </a:bodyPr>
-          <a:lstStyle/>
-          <a:p>
-            <a:pPr algn="just"/>
-            <a:r>
-              <a:rPr lang="en-US" dirty="0">
-                <a:latin typeface="Times New Roman" panose="02020603050405020304" pitchFamily="18" charset="0"/>
-                <a:cs typeface="Times New Roman" panose="02020603050405020304" pitchFamily="18" charset="0"/>
-              </a:rPr>
-              <a:t>We will now explain the rules of the games. You will use the F, J keys and the space bar to play. Put your left and right index fingers on the F and the J keys and put both thumbs on the space bar.</a:t>
+              <a:t>You will use the F, J keys and the space bar to play. Put your left and right index fingers on the F and the J keys and put both thumbs on the space bar.</a:t>
             </a:r>
           </a:p>
         </p:txBody>
@@ -4981,7 +5175,7 @@
         </p:nvGrpSpPr>
         <p:grpSpPr>
           <a:xfrm>
-            <a:off x="800003" y="2534256"/>
+            <a:off x="808310" y="2686658"/>
             <a:ext cx="7543994" cy="3146611"/>
             <a:chOff x="322535" y="2339789"/>
             <a:chExt cx="8498929" cy="3590364"/>
@@ -5206,215 +5400,192 @@
           </a:p>
         </p:txBody>
       </p:sp>
-      <p:grpSp>
-        <p:nvGrpSpPr>
-          <p:cNvPr id="25" name="Group 24">
-            <a:extLst>
-              <a:ext uri="{FF2B5EF4-FFF2-40B4-BE49-F238E27FC236}">
-                <a16:creationId xmlns:a16="http://schemas.microsoft.com/office/drawing/2014/main" id="{354B2D6B-3CB1-1F42-8EA1-8761A14F4B39}"/>
-              </a:ext>
-            </a:extLst>
-          </p:cNvPr>
-          <p:cNvGrpSpPr/>
-          <p:nvPr/>
-        </p:nvGrpSpPr>
-        <p:grpSpPr>
-          <a:xfrm>
-            <a:off x="701139" y="699848"/>
-            <a:ext cx="7741722" cy="430306"/>
-            <a:chOff x="-12991" y="1317811"/>
-            <a:chExt cx="7741722" cy="430306"/>
-          </a:xfrm>
-        </p:grpSpPr>
-        <p:sp>
-          <p:nvSpPr>
-            <p:cNvPr id="26" name="Rectangle 25">
-              <a:extLst>
-                <a:ext uri="{FF2B5EF4-FFF2-40B4-BE49-F238E27FC236}">
-                  <a16:creationId xmlns:a16="http://schemas.microsoft.com/office/drawing/2014/main" id="{7D822C11-333C-524C-9872-1E305A9E2795}"/>
-                </a:ext>
-              </a:extLst>
-            </p:cNvPr>
-            <p:cNvSpPr/>
-            <p:nvPr/>
-          </p:nvSpPr>
-          <p:spPr>
-            <a:xfrm>
-              <a:off x="-12991" y="1317811"/>
-              <a:ext cx="5741438" cy="430306"/>
-            </a:xfrm>
-            <a:prstGeom prst="rect">
-              <a:avLst/>
-            </a:prstGeom>
-            <a:solidFill>
-              <a:srgbClr val="00B050"/>
-            </a:solidFill>
-            <a:ln w="25400">
-              <a:solidFill>
-                <a:schemeClr val="tx1"/>
-              </a:solidFill>
-            </a:ln>
-            <a:effectLst/>
-          </p:spPr>
-          <p:style>
-            <a:lnRef idx="1">
-              <a:schemeClr val="accent1"/>
-            </a:lnRef>
-            <a:fillRef idx="3">
-              <a:schemeClr val="accent1"/>
-            </a:fillRef>
-            <a:effectRef idx="2">
-              <a:schemeClr val="accent1"/>
-            </a:effectRef>
-            <a:fontRef idx="minor">
-              <a:schemeClr val="lt1"/>
-            </a:fontRef>
-          </p:style>
-          <p:txBody>
-            <a:bodyPr rtlCol="0" anchor="ctr"/>
-            <a:lstStyle/>
-            <a:p>
-              <a:pPr algn="ctr"/>
-              <a:r>
-                <a:rPr lang="en-BE" dirty="0">
-                  <a:solidFill>
-                    <a:schemeClr val="tx1"/>
-                  </a:solidFill>
-                </a:rPr>
-                <a:t>1</a:t>
-              </a:r>
-            </a:p>
-          </p:txBody>
-        </p:sp>
-        <p:sp>
-          <p:nvSpPr>
-            <p:cNvPr id="27" name="Rectangle 26">
-              <a:extLst>
-                <a:ext uri="{FF2B5EF4-FFF2-40B4-BE49-F238E27FC236}">
-                  <a16:creationId xmlns:a16="http://schemas.microsoft.com/office/drawing/2014/main" id="{DAB26992-1E7A-114C-BFFD-EB0FA33B71BE}"/>
-                </a:ext>
-              </a:extLst>
-            </p:cNvPr>
-            <p:cNvSpPr/>
-            <p:nvPr/>
-          </p:nvSpPr>
-          <p:spPr>
-            <a:xfrm>
-              <a:off x="5728447" y="1317811"/>
-              <a:ext cx="819815" cy="430306"/>
-            </a:xfrm>
-            <a:prstGeom prst="rect">
-              <a:avLst/>
-            </a:prstGeom>
-            <a:solidFill>
-              <a:schemeClr val="bg1">
-                <a:lumMod val="75000"/>
-              </a:schemeClr>
-            </a:solidFill>
-            <a:ln w="25400">
-              <a:solidFill>
-                <a:schemeClr val="tx1"/>
-              </a:solidFill>
-            </a:ln>
-            <a:effectLst/>
-          </p:spPr>
-          <p:style>
-            <a:lnRef idx="1">
-              <a:schemeClr val="accent1"/>
-            </a:lnRef>
-            <a:fillRef idx="3">
-              <a:schemeClr val="accent1"/>
-            </a:fillRef>
-            <a:effectRef idx="2">
-              <a:schemeClr val="accent1"/>
-            </a:effectRef>
-            <a:fontRef idx="minor">
-              <a:schemeClr val="lt1"/>
-            </a:fontRef>
-          </p:style>
-          <p:txBody>
-            <a:bodyPr rtlCol="0" anchor="ctr"/>
-            <a:lstStyle/>
-            <a:p>
-              <a:pPr algn="ctr"/>
-              <a:r>
-                <a:rPr lang="en-BE" dirty="0">
-                  <a:solidFill>
-                    <a:schemeClr val="tx1"/>
-                  </a:solidFill>
-                </a:rPr>
-                <a:t>2</a:t>
-              </a:r>
-            </a:p>
-          </p:txBody>
-        </p:sp>
-        <p:sp>
-          <p:nvSpPr>
-            <p:cNvPr id="28" name="Rectangle 27">
-              <a:extLst>
-                <a:ext uri="{FF2B5EF4-FFF2-40B4-BE49-F238E27FC236}">
-                  <a16:creationId xmlns:a16="http://schemas.microsoft.com/office/drawing/2014/main" id="{757A09A3-6301-3A49-8AE4-927F2DE74730}"/>
-                </a:ext>
-              </a:extLst>
-            </p:cNvPr>
-            <p:cNvSpPr/>
-            <p:nvPr/>
-          </p:nvSpPr>
-          <p:spPr>
-            <a:xfrm>
-              <a:off x="6548262" y="1317811"/>
-              <a:ext cx="1180469" cy="430306"/>
-            </a:xfrm>
-            <a:prstGeom prst="rect">
-              <a:avLst/>
-            </a:prstGeom>
-            <a:solidFill>
-              <a:schemeClr val="bg1">
-                <a:lumMod val="75000"/>
-              </a:schemeClr>
-            </a:solidFill>
-            <a:ln w="25400">
-              <a:solidFill>
-                <a:schemeClr val="tx1"/>
-              </a:solidFill>
-            </a:ln>
-            <a:effectLst/>
-          </p:spPr>
-          <p:style>
-            <a:lnRef idx="1">
-              <a:schemeClr val="accent1"/>
-            </a:lnRef>
-            <a:fillRef idx="3">
-              <a:schemeClr val="accent1"/>
-            </a:fillRef>
-            <a:effectRef idx="2">
-              <a:schemeClr val="accent1"/>
-            </a:effectRef>
-            <a:fontRef idx="minor">
-              <a:schemeClr val="lt1"/>
-            </a:fontRef>
-          </p:style>
-          <p:txBody>
-            <a:bodyPr rtlCol="0" anchor="ctr"/>
-            <a:lstStyle/>
-            <a:p>
-              <a:pPr algn="ctr"/>
-              <a:r>
-                <a:rPr lang="en-BE" dirty="0">
-                  <a:solidFill>
-                    <a:schemeClr val="tx1"/>
-                  </a:solidFill>
-                </a:rPr>
-                <a:t>3</a:t>
-              </a:r>
-            </a:p>
-          </p:txBody>
-        </p:sp>
-      </p:grpSp>
     </p:spTree>
     <p:extLst>
       <p:ext uri="{BB962C8B-B14F-4D97-AF65-F5344CB8AC3E}">
         <p14:creationId xmlns:p14="http://schemas.microsoft.com/office/powerpoint/2010/main" val="756401978"/>
+      </p:ext>
+    </p:extLst>
+  </p:cSld>
+  <p:clrMapOvr>
+    <a:masterClrMapping/>
+  </p:clrMapOvr>
+</p:sld>
+</file>
+
+<file path=ppt/slides/slide3.xml><?xml version="1.0" encoding="utf-8"?>
+<p:sld xmlns:a="http://schemas.openxmlformats.org/drawingml/2006/main" xmlns:r="http://schemas.openxmlformats.org/officeDocument/2006/relationships" xmlns:p="http://schemas.openxmlformats.org/presentationml/2006/main">
+  <p:cSld>
+    <p:spTree>
+      <p:nvGrpSpPr>
+        <p:cNvPr id="1" name=""/>
+        <p:cNvGrpSpPr/>
+        <p:nvPr/>
+      </p:nvGrpSpPr>
+      <p:grpSpPr>
+        <a:xfrm>
+          <a:off x="0" y="0"/>
+          <a:ext cx="0" cy="0"/>
+          <a:chOff x="0" y="0"/>
+          <a:chExt cx="0" cy="0"/>
+        </a:xfrm>
+      </p:grpSpPr>
+      <p:sp>
+        <p:nvSpPr>
+          <p:cNvPr id="9" name="TextBox 8">
+            <a:extLst>
+              <a:ext uri="{FF2B5EF4-FFF2-40B4-BE49-F238E27FC236}">
+                <a16:creationId xmlns:a16="http://schemas.microsoft.com/office/drawing/2014/main" id="{57BE667A-B7F8-4643-BF78-54477066EA91}"/>
+              </a:ext>
+            </a:extLst>
+          </p:cNvPr>
+          <p:cNvSpPr txBox="1"/>
+          <p:nvPr/>
+        </p:nvSpPr>
+        <p:spPr>
+          <a:xfrm>
+            <a:off x="529119" y="1274417"/>
+            <a:ext cx="8085762" cy="1477328"/>
+          </a:xfrm>
+          <a:prstGeom prst="rect">
+            <a:avLst/>
+          </a:prstGeom>
+          <a:noFill/>
+        </p:spPr>
+        <p:txBody>
+          <a:bodyPr wrap="square" rtlCol="0">
+            <a:spAutoFit/>
+          </a:bodyPr>
+          <a:lstStyle/>
+          <a:p>
+            <a:pPr algn="just"/>
+            <a:r>
+              <a:rPr lang="en-US" dirty="0">
+                <a:latin typeface="Times New Roman" panose="02020603050405020304" pitchFamily="18" charset="0"/>
+                <a:cs typeface="Times New Roman" panose="02020603050405020304" pitchFamily="18" charset="0"/>
+              </a:rPr>
+              <a:t>The game consists of 6 blocks. The first two blocks are practice blocks and are quite short (about 1 minute per block). The remaining 4 blocks are experimental blocks and will be somewhat longer (about 4 minutes per block).</a:t>
+            </a:r>
+          </a:p>
+          <a:p>
+            <a:pPr algn="just"/>
+            <a:endParaRPr lang="en-US" dirty="0">
+              <a:latin typeface="Times New Roman" panose="02020603050405020304" pitchFamily="18" charset="0"/>
+              <a:cs typeface="Times New Roman" panose="02020603050405020304" pitchFamily="18" charset="0"/>
+            </a:endParaRPr>
+          </a:p>
+          <a:p>
+            <a:pPr algn="just"/>
+            <a:r>
+              <a:rPr lang="en-US" dirty="0">
+                <a:latin typeface="Times New Roman" panose="02020603050405020304" pitchFamily="18" charset="0"/>
+                <a:cs typeface="Times New Roman" panose="02020603050405020304" pitchFamily="18" charset="0"/>
+              </a:rPr>
+              <a:t>We will now explain the rules of the first game, the </a:t>
+            </a:r>
+            <a:r>
+              <a:rPr lang="en-US" b="1" dirty="0">
+                <a:latin typeface="Times New Roman" panose="02020603050405020304" pitchFamily="18" charset="0"/>
+                <a:cs typeface="Times New Roman" panose="02020603050405020304" pitchFamily="18" charset="0"/>
+              </a:rPr>
+              <a:t>guessing</a:t>
+            </a:r>
+            <a:r>
+              <a:rPr lang="en-US" dirty="0">
+                <a:latin typeface="Times New Roman" panose="02020603050405020304" pitchFamily="18" charset="0"/>
+                <a:cs typeface="Times New Roman" panose="02020603050405020304" pitchFamily="18" charset="0"/>
+              </a:rPr>
+              <a:t> games.</a:t>
+            </a:r>
+          </a:p>
+        </p:txBody>
+      </p:sp>
+      <p:sp>
+        <p:nvSpPr>
+          <p:cNvPr id="13" name="TextBox 12">
+            <a:extLst>
+              <a:ext uri="{FF2B5EF4-FFF2-40B4-BE49-F238E27FC236}">
+                <a16:creationId xmlns:a16="http://schemas.microsoft.com/office/drawing/2014/main" id="{75F68904-EA50-114C-B9CC-CFBE25AB1481}"/>
+              </a:ext>
+            </a:extLst>
+          </p:cNvPr>
+          <p:cNvSpPr txBox="1"/>
+          <p:nvPr/>
+        </p:nvSpPr>
+        <p:spPr>
+          <a:xfrm>
+            <a:off x="537426" y="6092580"/>
+            <a:ext cx="8085762" cy="369332"/>
+          </a:xfrm>
+          <a:prstGeom prst="rect">
+            <a:avLst/>
+          </a:prstGeom>
+          <a:noFill/>
+        </p:spPr>
+        <p:txBody>
+          <a:bodyPr wrap="square" rtlCol="0">
+            <a:spAutoFit/>
+          </a:bodyPr>
+          <a:lstStyle/>
+          <a:p>
+            <a:pPr algn="ctr"/>
+            <a:r>
+              <a:rPr lang="en-US" dirty="0">
+                <a:latin typeface="Times New Roman" panose="02020603050405020304" pitchFamily="18" charset="0"/>
+                <a:cs typeface="Times New Roman" panose="02020603050405020304" pitchFamily="18" charset="0"/>
+              </a:rPr>
+              <a:t>Press F to see the previous page; press J to see the next page.</a:t>
+            </a:r>
+          </a:p>
+        </p:txBody>
+      </p:sp>
+      <p:sp>
+        <p:nvSpPr>
+          <p:cNvPr id="2" name="TextBox 1">
+            <a:extLst>
+              <a:ext uri="{FF2B5EF4-FFF2-40B4-BE49-F238E27FC236}">
+                <a16:creationId xmlns:a16="http://schemas.microsoft.com/office/drawing/2014/main" id="{9E4776CD-DBEC-CF77-1E83-33861A8F3C49}"/>
+              </a:ext>
+            </a:extLst>
+          </p:cNvPr>
+          <p:cNvSpPr txBox="1"/>
+          <p:nvPr/>
+        </p:nvSpPr>
+        <p:spPr>
+          <a:xfrm>
+            <a:off x="529119" y="3429000"/>
+            <a:ext cx="8085762" cy="646331"/>
+          </a:xfrm>
+          <a:prstGeom prst="rect">
+            <a:avLst/>
+          </a:prstGeom>
+          <a:noFill/>
+        </p:spPr>
+        <p:txBody>
+          <a:bodyPr wrap="square" rtlCol="0">
+            <a:spAutoFit/>
+          </a:bodyPr>
+          <a:lstStyle/>
+          <a:p>
+            <a:pPr algn="just"/>
+            <a:r>
+              <a:rPr lang="en-US" b="1" dirty="0">
+                <a:latin typeface="Times New Roman" panose="02020603050405020304" pitchFamily="18" charset="0"/>
+                <a:cs typeface="Times New Roman" panose="02020603050405020304" pitchFamily="18" charset="0"/>
+              </a:rPr>
+              <a:t>IMPORTANT: Do not refresh the page during the experiment. Refreshing the page will restart the experiment from the beginning.</a:t>
+            </a:r>
+            <a:endParaRPr lang="en-US" dirty="0">
+              <a:latin typeface="Times New Roman" panose="02020603050405020304" pitchFamily="18" charset="0"/>
+              <a:cs typeface="Times New Roman" panose="02020603050405020304" pitchFamily="18" charset="0"/>
+            </a:endParaRPr>
+          </a:p>
+        </p:txBody>
+      </p:sp>
+    </p:spTree>
+    <p:extLst>
+      <p:ext uri="{BB962C8B-B14F-4D97-AF65-F5344CB8AC3E}">
+        <p14:creationId xmlns:p14="http://schemas.microsoft.com/office/powerpoint/2010/main" val="4264399685"/>
       </p:ext>
     </p:extLst>
   </p:cSld>
@@ -5455,8 +5626,8 @@
         </p:nvSpPr>
         <p:spPr>
           <a:xfrm>
-            <a:off x="537426" y="641371"/>
-            <a:ext cx="8085762" cy="1754326"/>
+            <a:off x="537426" y="1271700"/>
+            <a:ext cx="8085762" cy="1477328"/>
           </a:xfrm>
           <a:prstGeom prst="rect">
             <a:avLst/>
@@ -5475,7 +5646,7 @@
                 <a:latin typeface="Times New Roman" panose="02020603050405020304" pitchFamily="18" charset="0"/>
                 <a:cs typeface="Times New Roman" panose="02020603050405020304" pitchFamily="18" charset="0"/>
               </a:rPr>
-              <a:t>The first task consists of two types of games, the </a:t>
+              <a:t>At the beginning of each </a:t>
             </a:r>
             <a:r>
               <a:rPr lang="en-US" b="1" dirty="0">
@@ -5489,21 +5660,7 @@
                 <a:latin typeface="Times New Roman" panose="02020603050405020304" pitchFamily="18" charset="0"/>
                 <a:cs typeface="Times New Roman" panose="02020603050405020304" pitchFamily="18" charset="0"/>
               </a:rPr>
-              <a:t> game and the </a:t>
-            </a:r>
-            <a:r>
-              <a:rPr lang="en-US" b="1" dirty="0">
-                <a:latin typeface="Times New Roman" panose="02020603050405020304" pitchFamily="18" charset="0"/>
-                <a:cs typeface="Times New Roman" panose="02020603050405020304" pitchFamily="18" charset="0"/>
-              </a:rPr>
-              <a:t>choice</a:t>
-            </a:r>
-            <a:r>
-              <a:rPr lang="en-US" dirty="0">
-                <a:latin typeface="Times New Roman" panose="02020603050405020304" pitchFamily="18" charset="0"/>
-                <a:cs typeface="Times New Roman" panose="02020603050405020304" pitchFamily="18" charset="0"/>
-              </a:rPr>
-              <a:t> game. You will alternate between these two types of games.</a:t>
+              <a:t> game, the program will tell you how many games there are in the current block, and which game you are going to play next (see an example below).</a:t>
             </a:r>
           </a:p>
           <a:p>
@@ -5520,21 +5677,21 @@
                 <a:latin typeface="Times New Roman" panose="02020603050405020304" pitchFamily="18" charset="0"/>
                 <a:cs typeface="Times New Roman" panose="02020603050405020304" pitchFamily="18" charset="0"/>
               </a:rPr>
-              <a:t>Before each game starts, you will see a message telling you which game you are going to play next (see a screen shot below). You need to press </a:t>
+              <a:t>You can </a:t>
             </a:r>
             <a:r>
               <a:rPr lang="en-US" b="1" dirty="0">
                 <a:latin typeface="Times New Roman" panose="02020603050405020304" pitchFamily="18" charset="0"/>
                 <a:cs typeface="Times New Roman" panose="02020603050405020304" pitchFamily="18" charset="0"/>
               </a:rPr>
-              <a:t>the space bar</a:t>
+              <a:t>press the space bar </a:t>
             </a:r>
             <a:r>
               <a:rPr lang="en-US" dirty="0">
                 <a:latin typeface="Times New Roman" panose="02020603050405020304" pitchFamily="18" charset="0"/>
                 <a:cs typeface="Times New Roman" panose="02020603050405020304" pitchFamily="18" charset="0"/>
               </a:rPr>
-              <a:t> to start a game.</a:t>
+              <a:t>to start a game. </a:t>
             </a:r>
           </a:p>
         </p:txBody>
@@ -5578,12 +5735,65 @@
           </a:p>
         </p:txBody>
       </p:sp>
+      <p:sp>
+        <p:nvSpPr>
+          <p:cNvPr id="2" name="TextBox 1">
+            <a:extLst>
+              <a:ext uri="{FF2B5EF4-FFF2-40B4-BE49-F238E27FC236}">
+                <a16:creationId xmlns:a16="http://schemas.microsoft.com/office/drawing/2014/main" id="{924D3C3B-04CF-C147-9FDE-1D0BE57287C0}"/>
+              </a:ext>
+            </a:extLst>
+          </p:cNvPr>
+          <p:cNvSpPr txBox="1"/>
+          <p:nvPr/>
+        </p:nvSpPr>
+        <p:spPr>
+          <a:xfrm>
+            <a:off x="586529" y="322729"/>
+            <a:ext cx="7912012" cy="584775"/>
+          </a:xfrm>
+          <a:prstGeom prst="rect">
+            <a:avLst/>
+          </a:prstGeom>
+          <a:noFill/>
+        </p:spPr>
+        <p:txBody>
+          <a:bodyPr wrap="square" rtlCol="0">
+            <a:spAutoFit/>
+          </a:bodyPr>
+          <a:lstStyle/>
+          <a:p>
+            <a:pPr algn="ctr"/>
+            <a:r>
+              <a:rPr lang="en-BE" sz="3200" dirty="0">
+                <a:latin typeface="Times New Roman" panose="02020603050405020304" pitchFamily="18" charset="0"/>
+                <a:cs typeface="Times New Roman" panose="02020603050405020304" pitchFamily="18" charset="0"/>
+              </a:rPr>
+              <a:t>Rules of the </a:t>
+            </a:r>
+            <a:r>
+              <a:rPr lang="en-BE" sz="3200" b="1" dirty="0">
+                <a:latin typeface="Times New Roman" panose="02020603050405020304" pitchFamily="18" charset="0"/>
+                <a:cs typeface="Times New Roman" panose="02020603050405020304" pitchFamily="18" charset="0"/>
+              </a:rPr>
+              <a:t>guessing</a:t>
+            </a:r>
+            <a:r>
+              <a:rPr lang="en-BE" sz="3200" dirty="0">
+                <a:latin typeface="Times New Roman" panose="02020603050405020304" pitchFamily="18" charset="0"/>
+                <a:cs typeface="Times New Roman" panose="02020603050405020304" pitchFamily="18" charset="0"/>
+              </a:rPr>
+              <a:t> game</a:t>
+            </a:r>
+          </a:p>
+        </p:txBody>
+      </p:sp>
       <p:pic>
         <p:nvPicPr>
-          <p:cNvPr id="3" name="Picture 2" descr="Graphical user interface, text&#10;&#10;Description automatically generated">
+          <p:cNvPr id="5" name="Picture 4">
             <a:extLst>
               <a:ext uri="{FF2B5EF4-FFF2-40B4-BE49-F238E27FC236}">
-                <a16:creationId xmlns:a16="http://schemas.microsoft.com/office/drawing/2014/main" id="{A27B94DC-CFBC-8749-BFB6-EB1921BE368C}"/>
+                <a16:creationId xmlns:a16="http://schemas.microsoft.com/office/drawing/2014/main" id="{FF66AAB9-79B2-7F59-F22C-405A09787745}"/>
               </a:ext>
             </a:extLst>
           </p:cNvPr>
@@ -5600,13 +5810,13 @@
         </p:blipFill>
         <p:spPr>
           <a:xfrm>
-            <a:off x="924339" y="3092460"/>
-            <a:ext cx="7501199" cy="2303357"/>
+            <a:off x="1222406" y="3429000"/>
+            <a:ext cx="6640258" cy="1742342"/>
           </a:xfrm>
           <a:prstGeom prst="rect">
             <a:avLst/>
           </a:prstGeom>
-          <a:ln w="25400">
+          <a:ln w="19050">
             <a:solidFill>
               <a:schemeClr val="tx1"/>
             </a:solidFill>
@@ -5616,7 +5826,7 @@
     </p:spTree>
     <p:extLst>
       <p:ext uri="{BB962C8B-B14F-4D97-AF65-F5344CB8AC3E}">
-        <p14:creationId xmlns:p14="http://schemas.microsoft.com/office/powerpoint/2010/main" val="4264399685"/>
+        <p14:creationId xmlns:p14="http://schemas.microsoft.com/office/powerpoint/2010/main" val="2871051257"/>
       </p:ext>
     </p:extLst>
   </p:cSld>
@@ -5657,8 +5867,8 @@
         </p:nvSpPr>
         <p:spPr>
           <a:xfrm>
-            <a:off x="537426" y="1040065"/>
-            <a:ext cx="8085762" cy="2031325"/>
+            <a:off x="537426" y="1145573"/>
+            <a:ext cx="8085762" cy="646331"/>
           </a:xfrm>
           <a:prstGeom prst="rect">
             <a:avLst/>
@@ -5677,38 +5887,7 @@
                 <a:latin typeface="Times New Roman" panose="02020603050405020304" pitchFamily="18" charset="0"/>
                 <a:cs typeface="Times New Roman" panose="02020603050405020304" pitchFamily="18" charset="0"/>
               </a:rPr>
-              <a:t>In the </a:t>
-            </a:r>
-            <a:r>
-              <a:rPr lang="en-US" b="1" dirty="0">
-                <a:latin typeface="Times New Roman" panose="02020603050405020304" pitchFamily="18" charset="0"/>
-                <a:cs typeface="Times New Roman" panose="02020603050405020304" pitchFamily="18" charset="0"/>
-              </a:rPr>
-              <a:t>guessing</a:t>
-            </a:r>
-            <a:r>
-              <a:rPr lang="en-US" dirty="0">
-                <a:latin typeface="Times New Roman" panose="02020603050405020304" pitchFamily="18" charset="0"/>
-                <a:cs typeface="Times New Roman" panose="02020603050405020304" pitchFamily="18" charset="0"/>
-              </a:rPr>
-              <a:t> game, you need to guess the color of a card. Sometimes you will see a card with both blue and yellow (see below) and need to guess the color of the other side of the card. You press F if you think the other side is blue, and J if you think the other side is yellow. </a:t>
-            </a:r>
-          </a:p>
-          <a:p>
-            <a:pPr algn="just"/>
-            <a:endParaRPr lang="en-US" dirty="0">
-              <a:latin typeface="Times New Roman" panose="02020603050405020304" pitchFamily="18" charset="0"/>
-              <a:cs typeface="Times New Roman" panose="02020603050405020304" pitchFamily="18" charset="0"/>
-            </a:endParaRPr>
-          </a:p>
-          <a:p>
-            <a:pPr algn="just"/>
-            <a:r>
-              <a:rPr lang="en-US" dirty="0">
-                <a:latin typeface="Times New Roman" panose="02020603050405020304" pitchFamily="18" charset="0"/>
-                <a:cs typeface="Times New Roman" panose="02020603050405020304" pitchFamily="18" charset="0"/>
-              </a:rPr>
-              <a:t>After your guess, the card will be turned. If your guess is correct, you win 40 points; if your guess is incorrect, you lose 40 points.</a:t>
+              <a:t>You will then see a wheel, with both yellow and blue parts (see below). Your task is to guess after spinning the wheel, whether the arrow will point at yellow or blue.</a:t>
             </a:r>
           </a:p>
         </p:txBody>
@@ -5752,36 +5931,6 @@
           </a:p>
         </p:txBody>
       </p:sp>
-      <p:pic>
-        <p:nvPicPr>
-          <p:cNvPr id="5" name="Picture 4" descr="A picture containing square&#10;&#10;Description automatically generated">
-            <a:extLst>
-              <a:ext uri="{FF2B5EF4-FFF2-40B4-BE49-F238E27FC236}">
-                <a16:creationId xmlns:a16="http://schemas.microsoft.com/office/drawing/2014/main" id="{B89DD466-11B1-974D-957F-7828B8155C47}"/>
-              </a:ext>
-            </a:extLst>
-          </p:cNvPr>
-          <p:cNvPicPr>
-            <a:picLocks noChangeAspect="1"/>
-          </p:cNvPicPr>
-          <p:nvPr/>
-        </p:nvPicPr>
-        <p:blipFill>
-          <a:blip r:embed="rId2"/>
-          <a:stretch>
-            <a:fillRect/>
-          </a:stretch>
-        </p:blipFill>
-        <p:spPr>
-          <a:xfrm>
-            <a:off x="586529" y="3371026"/>
-            <a:ext cx="8036659" cy="2404670"/>
-          </a:xfrm>
-          <a:prstGeom prst="rect">
-            <a:avLst/>
-          </a:prstGeom>
-        </p:spPr>
-      </p:pic>
       <p:sp>
         <p:nvSpPr>
           <p:cNvPr id="2" name="TextBox 1">
@@ -5835,10 +5984,44 @@
           </a:p>
         </p:txBody>
       </p:sp>
+      <p:pic>
+        <p:nvPicPr>
+          <p:cNvPr id="4" name="Picture 3">
+            <a:extLst>
+              <a:ext uri="{FF2B5EF4-FFF2-40B4-BE49-F238E27FC236}">
+                <a16:creationId xmlns:a16="http://schemas.microsoft.com/office/drawing/2014/main" id="{E44BA402-F30C-A90B-EF95-8F934FC56EEF}"/>
+              </a:ext>
+            </a:extLst>
+          </p:cNvPr>
+          <p:cNvPicPr>
+            <a:picLocks noChangeAspect="1"/>
+          </p:cNvPicPr>
+          <p:nvPr/>
+        </p:nvPicPr>
+        <p:blipFill rotWithShape="1">
+          <a:blip r:embed="rId2"/>
+          <a:srcRect l="8303" t="2694" r="10126" b="1"/>
+          <a:stretch/>
+        </p:blipFill>
+        <p:spPr>
+          <a:xfrm>
+            <a:off x="2133600" y="2286000"/>
+            <a:ext cx="4712677" cy="3669323"/>
+          </a:xfrm>
+          <a:prstGeom prst="rect">
+            <a:avLst/>
+          </a:prstGeom>
+          <a:ln w="19050">
+            <a:solidFill>
+              <a:schemeClr val="tx1"/>
+            </a:solidFill>
+          </a:ln>
+        </p:spPr>
+      </p:pic>
     </p:spTree>
     <p:extLst>
       <p:ext uri="{BB962C8B-B14F-4D97-AF65-F5344CB8AC3E}">
-        <p14:creationId xmlns:p14="http://schemas.microsoft.com/office/powerpoint/2010/main" val="2871051257"/>
+        <p14:creationId xmlns:p14="http://schemas.microsoft.com/office/powerpoint/2010/main" val="2066345427"/>
       </p:ext>
     </p:extLst>
   </p:cSld>
@@ -5865,12 +6048,207 @@
           <a:chExt cx="0" cy="0"/>
         </a:xfrm>
       </p:grpSpPr>
+      <p:sp>
+        <p:nvSpPr>
+          <p:cNvPr id="9" name="TextBox 8">
+            <a:extLst>
+              <a:ext uri="{FF2B5EF4-FFF2-40B4-BE49-F238E27FC236}">
+                <a16:creationId xmlns:a16="http://schemas.microsoft.com/office/drawing/2014/main" id="{57BE667A-B7F8-4643-BF78-54477066EA91}"/>
+              </a:ext>
+            </a:extLst>
+          </p:cNvPr>
+          <p:cNvSpPr txBox="1"/>
+          <p:nvPr/>
+        </p:nvSpPr>
+        <p:spPr>
+          <a:xfrm>
+            <a:off x="537426" y="1040065"/>
+            <a:ext cx="8085762" cy="369332"/>
+          </a:xfrm>
+          <a:prstGeom prst="rect">
+            <a:avLst/>
+          </a:prstGeom>
+          <a:noFill/>
+        </p:spPr>
+        <p:txBody>
+          <a:bodyPr wrap="square" rtlCol="0">
+            <a:spAutoFit/>
+          </a:bodyPr>
+          <a:lstStyle/>
+          <a:p>
+            <a:pPr algn="just"/>
+            <a:endParaRPr lang="en-US" dirty="0">
+              <a:latin typeface="Times New Roman" panose="02020603050405020304" pitchFamily="18" charset="0"/>
+              <a:cs typeface="Times New Roman" panose="02020603050405020304" pitchFamily="18" charset="0"/>
+            </a:endParaRPr>
+          </a:p>
+        </p:txBody>
+      </p:sp>
+      <p:sp>
+        <p:nvSpPr>
+          <p:cNvPr id="13" name="TextBox 12">
+            <a:extLst>
+              <a:ext uri="{FF2B5EF4-FFF2-40B4-BE49-F238E27FC236}">
+                <a16:creationId xmlns:a16="http://schemas.microsoft.com/office/drawing/2014/main" id="{75F68904-EA50-114C-B9CC-CFBE25AB1481}"/>
+              </a:ext>
+            </a:extLst>
+          </p:cNvPr>
+          <p:cNvSpPr txBox="1"/>
+          <p:nvPr/>
+        </p:nvSpPr>
+        <p:spPr>
+          <a:xfrm>
+            <a:off x="537426" y="6092580"/>
+            <a:ext cx="8085762" cy="369332"/>
+          </a:xfrm>
+          <a:prstGeom prst="rect">
+            <a:avLst/>
+          </a:prstGeom>
+          <a:noFill/>
+        </p:spPr>
+        <p:txBody>
+          <a:bodyPr wrap="square" rtlCol="0">
+            <a:spAutoFit/>
+          </a:bodyPr>
+          <a:lstStyle/>
+          <a:p>
+            <a:pPr algn="ctr"/>
+            <a:r>
+              <a:rPr lang="en-US" dirty="0">
+                <a:latin typeface="Times New Roman" panose="02020603050405020304" pitchFamily="18" charset="0"/>
+                <a:cs typeface="Times New Roman" panose="02020603050405020304" pitchFamily="18" charset="0"/>
+              </a:rPr>
+              <a:t>Press F to see the previous page; press J to see the next page.</a:t>
+            </a:r>
+          </a:p>
+        </p:txBody>
+      </p:sp>
+      <p:sp>
+        <p:nvSpPr>
+          <p:cNvPr id="2" name="TextBox 1">
+            <a:extLst>
+              <a:ext uri="{FF2B5EF4-FFF2-40B4-BE49-F238E27FC236}">
+                <a16:creationId xmlns:a16="http://schemas.microsoft.com/office/drawing/2014/main" id="{924D3C3B-04CF-C147-9FDE-1D0BE57287C0}"/>
+              </a:ext>
+            </a:extLst>
+          </p:cNvPr>
+          <p:cNvSpPr txBox="1"/>
+          <p:nvPr/>
+        </p:nvSpPr>
+        <p:spPr>
+          <a:xfrm>
+            <a:off x="586529" y="322729"/>
+            <a:ext cx="7912012" cy="584775"/>
+          </a:xfrm>
+          <a:prstGeom prst="rect">
+            <a:avLst/>
+          </a:prstGeom>
+          <a:noFill/>
+        </p:spPr>
+        <p:txBody>
+          <a:bodyPr wrap="square" rtlCol="0">
+            <a:spAutoFit/>
+          </a:bodyPr>
+          <a:lstStyle/>
+          <a:p>
+            <a:pPr algn="ctr"/>
+            <a:r>
+              <a:rPr lang="en-BE" sz="3200" dirty="0">
+                <a:latin typeface="Times New Roman" panose="02020603050405020304" pitchFamily="18" charset="0"/>
+                <a:cs typeface="Times New Roman" panose="02020603050405020304" pitchFamily="18" charset="0"/>
+              </a:rPr>
+              <a:t>Rules of the </a:t>
+            </a:r>
+            <a:r>
+              <a:rPr lang="en-BE" sz="3200" b="1" dirty="0">
+                <a:latin typeface="Times New Roman" panose="02020603050405020304" pitchFamily="18" charset="0"/>
+                <a:cs typeface="Times New Roman" panose="02020603050405020304" pitchFamily="18" charset="0"/>
+              </a:rPr>
+              <a:t>guessing</a:t>
+            </a:r>
+            <a:r>
+              <a:rPr lang="en-BE" sz="3200" dirty="0">
+                <a:latin typeface="Times New Roman" panose="02020603050405020304" pitchFamily="18" charset="0"/>
+                <a:cs typeface="Times New Roman" panose="02020603050405020304" pitchFamily="18" charset="0"/>
+              </a:rPr>
+              <a:t> game</a:t>
+            </a:r>
+          </a:p>
+        </p:txBody>
+      </p:sp>
+      <p:sp>
+        <p:nvSpPr>
+          <p:cNvPr id="3" name="TextBox 2">
+            <a:extLst>
+              <a:ext uri="{FF2B5EF4-FFF2-40B4-BE49-F238E27FC236}">
+                <a16:creationId xmlns:a16="http://schemas.microsoft.com/office/drawing/2014/main" id="{1EE0C57C-C3CC-2873-3AD6-5E34AD57AC22}"/>
+              </a:ext>
+            </a:extLst>
+          </p:cNvPr>
+          <p:cNvSpPr txBox="1"/>
+          <p:nvPr/>
+        </p:nvSpPr>
+        <p:spPr>
+          <a:xfrm>
+            <a:off x="257750" y="907504"/>
+            <a:ext cx="8569569" cy="923330"/>
+          </a:xfrm>
+          <a:prstGeom prst="rect">
+            <a:avLst/>
+          </a:prstGeom>
+          <a:noFill/>
+        </p:spPr>
+        <p:txBody>
+          <a:bodyPr wrap="square" rtlCol="0">
+            <a:spAutoFit/>
+          </a:bodyPr>
+          <a:lstStyle/>
+          <a:p>
+            <a:pPr algn="just"/>
+            <a:r>
+              <a:rPr lang="en-US" dirty="0">
+                <a:latin typeface="Times New Roman" panose="02020603050405020304" pitchFamily="18" charset="0"/>
+                <a:cs typeface="Times New Roman" panose="02020603050405020304" pitchFamily="18" charset="0"/>
+              </a:rPr>
+              <a:t>If you think the arrow will point at yellow, </a:t>
+            </a:r>
+            <a:r>
+              <a:rPr lang="en-US" b="1" dirty="0">
+                <a:latin typeface="Times New Roman" panose="02020603050405020304" pitchFamily="18" charset="0"/>
+                <a:cs typeface="Times New Roman" panose="02020603050405020304" pitchFamily="18" charset="0"/>
+              </a:rPr>
+              <a:t>press F</a:t>
+            </a:r>
+            <a:r>
+              <a:rPr lang="en-US" dirty="0">
+                <a:latin typeface="Times New Roman" panose="02020603050405020304" pitchFamily="18" charset="0"/>
+                <a:cs typeface="Times New Roman" panose="02020603050405020304" pitchFamily="18" charset="0"/>
+              </a:rPr>
+              <a:t>; if you think the arrow will point at blue, </a:t>
+            </a:r>
+            <a:r>
+              <a:rPr lang="en-US" b="1" dirty="0">
+                <a:latin typeface="Times New Roman" panose="02020603050405020304" pitchFamily="18" charset="0"/>
+                <a:cs typeface="Times New Roman" panose="02020603050405020304" pitchFamily="18" charset="0"/>
+              </a:rPr>
+              <a:t>press J</a:t>
+            </a:r>
+            <a:r>
+              <a:rPr lang="en-US" dirty="0">
+                <a:latin typeface="Times New Roman" panose="02020603050405020304" pitchFamily="18" charset="0"/>
+                <a:cs typeface="Times New Roman" panose="02020603050405020304" pitchFamily="18" charset="0"/>
+              </a:rPr>
+              <a:t>. The program will then spin the wheel. If you guess correctly, you win 40 cents (see an example below); if you guess incorrectly, you lose 40 cents.</a:t>
+            </a:r>
+          </a:p>
+        </p:txBody>
+      </p:sp>
       <p:pic>
         <p:nvPicPr>
-          <p:cNvPr id="4" name="Picture 3" descr="Shape, square&#10;&#10;Description automatically generated">
+          <p:cNvPr id="8" name="Picture 7">
             <a:extLst>
               <a:ext uri="{FF2B5EF4-FFF2-40B4-BE49-F238E27FC236}">
-                <a16:creationId xmlns:a16="http://schemas.microsoft.com/office/drawing/2014/main" id="{4D0677F7-83AB-8946-B001-35CC774EDC18}"/>
+                <a16:creationId xmlns:a16="http://schemas.microsoft.com/office/drawing/2014/main" id="{2F4B4CE3-5DB0-7ECC-0F77-41F06609B030}"/>
               </a:ext>
             </a:extLst>
           </p:cNvPr>
@@ -5887,180 +6265,23 @@
         </p:blipFill>
         <p:spPr>
           <a:xfrm>
-            <a:off x="579630" y="3458411"/>
-            <a:ext cx="8026448" cy="2438714"/>
+            <a:off x="2268416" y="2009314"/>
+            <a:ext cx="4607168" cy="3941182"/>
           </a:xfrm>
           <a:prstGeom prst="rect">
             <a:avLst/>
           </a:prstGeom>
+          <a:ln w="19050">
+            <a:solidFill>
+              <a:schemeClr val="tx1"/>
+            </a:solidFill>
+          </a:ln>
         </p:spPr>
       </p:pic>
-      <p:sp>
-        <p:nvSpPr>
-          <p:cNvPr id="5" name="TextBox 4">
-            <a:extLst>
-              <a:ext uri="{FF2B5EF4-FFF2-40B4-BE49-F238E27FC236}">
-                <a16:creationId xmlns:a16="http://schemas.microsoft.com/office/drawing/2014/main" id="{F24654F7-B50D-154D-95F2-62F3930906CD}"/>
-              </a:ext>
-            </a:extLst>
-          </p:cNvPr>
-          <p:cNvSpPr txBox="1"/>
-          <p:nvPr/>
-        </p:nvSpPr>
-        <p:spPr>
-          <a:xfrm>
-            <a:off x="537426" y="1067977"/>
-            <a:ext cx="8085762" cy="2031325"/>
-          </a:xfrm>
-          <a:prstGeom prst="rect">
-            <a:avLst/>
-          </a:prstGeom>
-          <a:noFill/>
-        </p:spPr>
-        <p:txBody>
-          <a:bodyPr wrap="square" rtlCol="0">
-            <a:spAutoFit/>
-          </a:bodyPr>
-          <a:lstStyle/>
-          <a:p>
-            <a:pPr algn="just"/>
-            <a:r>
-              <a:rPr lang="en-US" dirty="0">
-                <a:latin typeface="Times New Roman" panose="02020603050405020304" pitchFamily="18" charset="0"/>
-                <a:cs typeface="Times New Roman" panose="02020603050405020304" pitchFamily="18" charset="0"/>
-              </a:rPr>
-              <a:t>Sometimes you will see a completely blue card or a completely yellow card (see below for a blue card). For these two cards, both sides have the same color. You therefore don’t need to guess. Instead, just press the F key if it is a blue card and press the J key if it is a yellow card.</a:t>
-            </a:r>
-          </a:p>
-          <a:p>
-            <a:pPr algn="just"/>
-            <a:endParaRPr lang="en-US" dirty="0">
-              <a:latin typeface="Times New Roman" panose="02020603050405020304" pitchFamily="18" charset="0"/>
-              <a:cs typeface="Times New Roman" panose="02020603050405020304" pitchFamily="18" charset="0"/>
-            </a:endParaRPr>
-          </a:p>
-          <a:p>
-            <a:pPr algn="just"/>
-            <a:r>
-              <a:rPr lang="en-US" dirty="0">
-                <a:latin typeface="Times New Roman" panose="02020603050405020304" pitchFamily="18" charset="0"/>
-                <a:cs typeface="Times New Roman" panose="02020603050405020304" pitchFamily="18" charset="0"/>
-              </a:rPr>
-              <a:t>After you press the correct key, the card will be turned. For these two cards, </a:t>
-            </a:r>
-            <a:r>
-              <a:rPr lang="en-US" b="1" dirty="0">
-                <a:latin typeface="Times New Roman" panose="02020603050405020304" pitchFamily="18" charset="0"/>
-                <a:cs typeface="Times New Roman" panose="02020603050405020304" pitchFamily="18" charset="0"/>
-              </a:rPr>
-              <a:t>you will not win or lose any points</a:t>
-            </a:r>
-            <a:r>
-              <a:rPr lang="en-US" dirty="0">
-                <a:latin typeface="Times New Roman" panose="02020603050405020304" pitchFamily="18" charset="0"/>
-                <a:cs typeface="Times New Roman" panose="02020603050405020304" pitchFamily="18" charset="0"/>
-              </a:rPr>
-              <a:t>. However, it is still important that you respond correctly.</a:t>
-            </a:r>
-          </a:p>
-        </p:txBody>
-      </p:sp>
-      <p:sp>
-        <p:nvSpPr>
-          <p:cNvPr id="6" name="TextBox 5">
-            <a:extLst>
-              <a:ext uri="{FF2B5EF4-FFF2-40B4-BE49-F238E27FC236}">
-                <a16:creationId xmlns:a16="http://schemas.microsoft.com/office/drawing/2014/main" id="{3AA524FC-A232-7A41-9444-83383FE941EE}"/>
-              </a:ext>
-            </a:extLst>
-          </p:cNvPr>
-          <p:cNvSpPr txBox="1"/>
-          <p:nvPr/>
-        </p:nvSpPr>
-        <p:spPr>
-          <a:xfrm>
-            <a:off x="586529" y="322729"/>
-            <a:ext cx="7912012" cy="584775"/>
-          </a:xfrm>
-          <a:prstGeom prst="rect">
-            <a:avLst/>
-          </a:prstGeom>
-          <a:noFill/>
-        </p:spPr>
-        <p:txBody>
-          <a:bodyPr wrap="square" rtlCol="0">
-            <a:spAutoFit/>
-          </a:bodyPr>
-          <a:lstStyle/>
-          <a:p>
-            <a:pPr algn="ctr"/>
-            <a:r>
-              <a:rPr lang="en-BE" sz="3200" dirty="0">
-                <a:latin typeface="Times New Roman" panose="02020603050405020304" pitchFamily="18" charset="0"/>
-                <a:cs typeface="Times New Roman" panose="02020603050405020304" pitchFamily="18" charset="0"/>
-              </a:rPr>
-              <a:t>Rules of the </a:t>
-            </a:r>
-            <a:r>
-              <a:rPr lang="en-BE" sz="3200" b="1" dirty="0">
-                <a:latin typeface="Times New Roman" panose="02020603050405020304" pitchFamily="18" charset="0"/>
-                <a:cs typeface="Times New Roman" panose="02020603050405020304" pitchFamily="18" charset="0"/>
-              </a:rPr>
-              <a:t>guessing</a:t>
-            </a:r>
-            <a:r>
-              <a:rPr lang="en-BE" sz="3200" dirty="0">
-                <a:latin typeface="Times New Roman" panose="02020603050405020304" pitchFamily="18" charset="0"/>
-                <a:cs typeface="Times New Roman" panose="02020603050405020304" pitchFamily="18" charset="0"/>
-              </a:rPr>
-              <a:t> game</a:t>
-            </a:r>
-          </a:p>
-        </p:txBody>
-      </p:sp>
-      <p:sp>
-        <p:nvSpPr>
-          <p:cNvPr id="7" name="TextBox 6">
-            <a:extLst>
-              <a:ext uri="{FF2B5EF4-FFF2-40B4-BE49-F238E27FC236}">
-                <a16:creationId xmlns:a16="http://schemas.microsoft.com/office/drawing/2014/main" id="{0ECA1A5C-CB10-F24D-9534-99C41C2319E3}"/>
-              </a:ext>
-            </a:extLst>
-          </p:cNvPr>
-          <p:cNvSpPr txBox="1"/>
-          <p:nvPr/>
-        </p:nvSpPr>
-        <p:spPr>
-          <a:xfrm>
-            <a:off x="537426" y="6092580"/>
-            <a:ext cx="8085762" cy="369332"/>
-          </a:xfrm>
-          <a:prstGeom prst="rect">
-            <a:avLst/>
-          </a:prstGeom>
-          <a:noFill/>
-        </p:spPr>
-        <p:txBody>
-          <a:bodyPr wrap="square" rtlCol="0">
-            <a:spAutoFit/>
-          </a:bodyPr>
-          <a:lstStyle/>
-          <a:p>
-            <a:pPr algn="ctr"/>
-            <a:r>
-              <a:rPr lang="en-US" dirty="0">
-                <a:latin typeface="Times New Roman" panose="02020603050405020304" pitchFamily="18" charset="0"/>
-                <a:cs typeface="Times New Roman" panose="02020603050405020304" pitchFamily="18" charset="0"/>
-              </a:rPr>
-              <a:t>Press F to see the previous page; press J to see the next page.</a:t>
-            </a:r>
-          </a:p>
-        </p:txBody>
-      </p:sp>
     </p:spTree>
     <p:extLst>
       <p:ext uri="{BB962C8B-B14F-4D97-AF65-F5344CB8AC3E}">
-        <p14:creationId xmlns:p14="http://schemas.microsoft.com/office/powerpoint/2010/main" val="3665134314"/>
+        <p14:creationId xmlns:p14="http://schemas.microsoft.com/office/powerpoint/2010/main" val="1362677026"/>
       </p:ext>
     </p:extLst>
   </p:cSld>
@@ -6089,10 +6310,10 @@
       </p:grpSpPr>
       <p:sp>
         <p:nvSpPr>
-          <p:cNvPr id="5" name="TextBox 4">
+          <p:cNvPr id="9" name="TextBox 8">
             <a:extLst>
               <a:ext uri="{FF2B5EF4-FFF2-40B4-BE49-F238E27FC236}">
-                <a16:creationId xmlns:a16="http://schemas.microsoft.com/office/drawing/2014/main" id="{F24654F7-B50D-154D-95F2-62F3930906CD}"/>
+                <a16:creationId xmlns:a16="http://schemas.microsoft.com/office/drawing/2014/main" id="{57BE667A-B7F8-4643-BF78-54477066EA91}"/>
               </a:ext>
             </a:extLst>
           </p:cNvPr>
@@ -6101,8 +6322,8 @@
         </p:nvSpPr>
         <p:spPr>
           <a:xfrm>
-            <a:off x="537426" y="1410846"/>
-            <a:ext cx="8085762" cy="1754326"/>
+            <a:off x="537426" y="1040065"/>
+            <a:ext cx="8085762" cy="369332"/>
           </a:xfrm>
           <a:prstGeom prst="rect">
             <a:avLst/>
@@ -6114,30 +6335,6 @@
             <a:spAutoFit/>
           </a:bodyPr>
           <a:lstStyle/>
-          <a:p>
-            <a:pPr algn="just"/>
-            <a:r>
-              <a:rPr lang="en-US" dirty="0">
-                <a:latin typeface="Times New Roman" panose="02020603050405020304" pitchFamily="18" charset="0"/>
-                <a:cs typeface="Times New Roman" panose="02020603050405020304" pitchFamily="18" charset="0"/>
-              </a:rPr>
-              <a:t>In the </a:t>
-            </a:r>
-            <a:r>
-              <a:rPr lang="en-US" b="1" dirty="0">
-                <a:latin typeface="Times New Roman" panose="02020603050405020304" pitchFamily="18" charset="0"/>
-                <a:cs typeface="Times New Roman" panose="02020603050405020304" pitchFamily="18" charset="0"/>
-              </a:rPr>
-              <a:t>choice</a:t>
-            </a:r>
-            <a:r>
-              <a:rPr lang="en-US" dirty="0">
-                <a:latin typeface="Times New Roman" panose="02020603050405020304" pitchFamily="18" charset="0"/>
-                <a:cs typeface="Times New Roman" panose="02020603050405020304" pitchFamily="18" charset="0"/>
-              </a:rPr>
-              <a:t> game, you will see two choice options represented by two pie charts. </a:t>
-            </a:r>
-          </a:p>
           <a:p>
             <a:pPr algn="just"/>
             <a:endParaRPr lang="en-US" dirty="0">
@@ -6145,24 +6342,14 @@
               <a:cs typeface="Times New Roman" panose="02020603050405020304" pitchFamily="18" charset="0"/>
             </a:endParaRPr>
           </a:p>
-          <a:p>
-            <a:pPr algn="just"/>
-            <a:r>
-              <a:rPr lang="en-US" dirty="0">
-                <a:latin typeface="Times New Roman" panose="02020603050405020304" pitchFamily="18" charset="0"/>
-                <a:cs typeface="Times New Roman" panose="02020603050405020304" pitchFamily="18" charset="0"/>
-              </a:rPr>
-              <a:t>One option is a guaranteed number of points. This option is represented by a pie chart that is 100% green (see the example below). If you choose this option, the probability of winning the points is 100%. In the example below, if you pick this option, you will be guaranteed to win 50 points.</a:t>
-            </a:r>
-          </a:p>
-        </p:txBody>
-      </p:sp>
-      <p:sp>
-        <p:nvSpPr>
-          <p:cNvPr id="6" name="TextBox 5">
+        </p:txBody>
+      </p:sp>
+      <p:sp>
+        <p:nvSpPr>
+          <p:cNvPr id="13" name="TextBox 12">
             <a:extLst>
               <a:ext uri="{FF2B5EF4-FFF2-40B4-BE49-F238E27FC236}">
-                <a16:creationId xmlns:a16="http://schemas.microsoft.com/office/drawing/2014/main" id="{3AA524FC-A232-7A41-9444-83383FE941EE}"/>
+                <a16:creationId xmlns:a16="http://schemas.microsoft.com/office/drawing/2014/main" id="{75F68904-EA50-114C-B9CC-CFBE25AB1481}"/>
               </a:ext>
             </a:extLst>
           </p:cNvPr>
@@ -6171,8 +6358,8 @@
         </p:nvSpPr>
         <p:spPr>
           <a:xfrm>
-            <a:off x="586529" y="322729"/>
-            <a:ext cx="7912012" cy="584775"/>
+            <a:off x="537426" y="6092580"/>
+            <a:ext cx="8085762" cy="369332"/>
           </a:xfrm>
           <a:prstGeom prst="rect">
             <a:avLst/>
@@ -6187,35 +6374,21 @@
           <a:p>
             <a:pPr algn="ctr"/>
             <a:r>
-              <a:rPr lang="en-BE" sz="3200" dirty="0">
-                <a:latin typeface="Times New Roman" panose="02020603050405020304" pitchFamily="18" charset="0"/>
-                <a:cs typeface="Times New Roman" panose="02020603050405020304" pitchFamily="18" charset="0"/>
-              </a:rPr>
-              <a:t>Rules of the </a:t>
-            </a:r>
-            <a:r>
-              <a:rPr lang="en-BE" sz="3200" b="1" dirty="0">
-                <a:latin typeface="Times New Roman" panose="02020603050405020304" pitchFamily="18" charset="0"/>
-                <a:cs typeface="Times New Roman" panose="02020603050405020304" pitchFamily="18" charset="0"/>
-              </a:rPr>
-              <a:t>choice</a:t>
-            </a:r>
-            <a:r>
-              <a:rPr lang="en-BE" sz="3200" dirty="0">
-                <a:latin typeface="Times New Roman" panose="02020603050405020304" pitchFamily="18" charset="0"/>
-                <a:cs typeface="Times New Roman" panose="02020603050405020304" pitchFamily="18" charset="0"/>
-              </a:rPr>
-              <a:t> game</a:t>
-            </a:r>
-          </a:p>
-        </p:txBody>
-      </p:sp>
-      <p:sp>
-        <p:nvSpPr>
-          <p:cNvPr id="7" name="TextBox 6">
+              <a:rPr lang="en-US" dirty="0">
+                <a:latin typeface="Times New Roman" panose="02020603050405020304" pitchFamily="18" charset="0"/>
+                <a:cs typeface="Times New Roman" panose="02020603050405020304" pitchFamily="18" charset="0"/>
+              </a:rPr>
+              <a:t>Press F to see the previous page; press J to start Block 1.</a:t>
+            </a:r>
+          </a:p>
+        </p:txBody>
+      </p:sp>
+      <p:sp>
+        <p:nvSpPr>
+          <p:cNvPr id="2" name="TextBox 1">
             <a:extLst>
               <a:ext uri="{FF2B5EF4-FFF2-40B4-BE49-F238E27FC236}">
-                <a16:creationId xmlns:a16="http://schemas.microsoft.com/office/drawing/2014/main" id="{0ECA1A5C-CB10-F24D-9534-99C41C2319E3}"/>
+                <a16:creationId xmlns:a16="http://schemas.microsoft.com/office/drawing/2014/main" id="{924D3C3B-04CF-C147-9FDE-1D0BE57287C0}"/>
               </a:ext>
             </a:extLst>
           </p:cNvPr>
@@ -6224,8 +6397,8 @@
         </p:nvSpPr>
         <p:spPr>
           <a:xfrm>
-            <a:off x="537426" y="6092580"/>
-            <a:ext cx="8085762" cy="369332"/>
+            <a:off x="586529" y="322729"/>
+            <a:ext cx="7912012" cy="584775"/>
           </a:xfrm>
           <a:prstGeom prst="rect">
             <a:avLst/>
@@ -6240,51 +6413,106 @@
           <a:p>
             <a:pPr algn="ctr"/>
             <a:r>
-              <a:rPr lang="en-US" dirty="0">
-                <a:latin typeface="Times New Roman" panose="02020603050405020304" pitchFamily="18" charset="0"/>
-                <a:cs typeface="Times New Roman" panose="02020603050405020304" pitchFamily="18" charset="0"/>
-              </a:rPr>
-              <a:t>Press F to see the previous page; press J to see the next page.</a:t>
-            </a:r>
-          </a:p>
-        </p:txBody>
-      </p:sp>
-      <p:pic>
-        <p:nvPicPr>
-          <p:cNvPr id="3" name="Picture 2" descr="A picture containing chart&#10;&#10;Description automatically generated">
+              <a:rPr lang="en-BE" sz="3200" dirty="0">
+                <a:latin typeface="Times New Roman" panose="02020603050405020304" pitchFamily="18" charset="0"/>
+                <a:cs typeface="Times New Roman" panose="02020603050405020304" pitchFamily="18" charset="0"/>
+              </a:rPr>
+              <a:t>Rules of the </a:t>
+            </a:r>
+            <a:r>
+              <a:rPr lang="en-BE" sz="3200" b="1" dirty="0">
+                <a:latin typeface="Times New Roman" panose="02020603050405020304" pitchFamily="18" charset="0"/>
+                <a:cs typeface="Times New Roman" panose="02020603050405020304" pitchFamily="18" charset="0"/>
+              </a:rPr>
+              <a:t>guessing</a:t>
+            </a:r>
+            <a:r>
+              <a:rPr lang="en-BE" sz="3200" dirty="0">
+                <a:latin typeface="Times New Roman" panose="02020603050405020304" pitchFamily="18" charset="0"/>
+                <a:cs typeface="Times New Roman" panose="02020603050405020304" pitchFamily="18" charset="0"/>
+              </a:rPr>
+              <a:t> game</a:t>
+            </a:r>
+          </a:p>
+        </p:txBody>
+      </p:sp>
+      <p:sp>
+        <p:nvSpPr>
+          <p:cNvPr id="4" name="TextBox 3">
             <a:extLst>
               <a:ext uri="{FF2B5EF4-FFF2-40B4-BE49-F238E27FC236}">
-                <a16:creationId xmlns:a16="http://schemas.microsoft.com/office/drawing/2014/main" id="{4B238CC3-24CF-F346-AAEB-0F7889A0C529}"/>
+                <a16:creationId xmlns:a16="http://schemas.microsoft.com/office/drawing/2014/main" id="{1B452688-4F22-D32A-FFD5-A28A77502EBF}"/>
               </a:ext>
             </a:extLst>
           </p:cNvPr>
-          <p:cNvPicPr>
-            <a:picLocks noChangeAspect="1"/>
-          </p:cNvPicPr>
+          <p:cNvSpPr txBox="1"/>
           <p:nvPr/>
-        </p:nvPicPr>
-        <p:blipFill rotWithShape="1">
-          <a:blip r:embed="rId2"/>
-          <a:srcRect l="55184" r="-1"/>
-          <a:stretch/>
-        </p:blipFill>
-        <p:spPr>
-          <a:xfrm>
-            <a:off x="3543053" y="3619760"/>
-            <a:ext cx="1998964" cy="2257668"/>
+        </p:nvSpPr>
+        <p:spPr>
+          <a:xfrm>
+            <a:off x="586529" y="1864100"/>
+            <a:ext cx="8085762" cy="1477328"/>
           </a:xfrm>
           <a:prstGeom prst="rect">
             <a:avLst/>
           </a:prstGeom>
-          <a:ln w="25400">
-            <a:noFill/>
-          </a:ln>
-        </p:spPr>
-      </p:pic>
+          <a:noFill/>
+        </p:spPr>
+        <p:txBody>
+          <a:bodyPr wrap="square" rtlCol="0">
+            <a:spAutoFit/>
+          </a:bodyPr>
+          <a:lstStyle/>
+          <a:p>
+            <a:pPr algn="just"/>
+            <a:r>
+              <a:rPr lang="en-US" dirty="0">
+                <a:latin typeface="Times New Roman" panose="02020603050405020304" pitchFamily="18" charset="0"/>
+                <a:cs typeface="Times New Roman" panose="02020603050405020304" pitchFamily="18" charset="0"/>
+              </a:rPr>
+              <a:t>You will now receive 4 practice trials to get you familiar with the task.</a:t>
+            </a:r>
+          </a:p>
+          <a:p>
+            <a:pPr algn="just"/>
+            <a:endParaRPr lang="en-US" dirty="0">
+              <a:latin typeface="Times New Roman" panose="02020603050405020304" pitchFamily="18" charset="0"/>
+              <a:cs typeface="Times New Roman" panose="02020603050405020304" pitchFamily="18" charset="0"/>
+            </a:endParaRPr>
+          </a:p>
+          <a:p>
+            <a:pPr algn="just"/>
+            <a:r>
+              <a:rPr lang="en-US" dirty="0">
+                <a:latin typeface="Times New Roman" panose="02020603050405020304" pitchFamily="18" charset="0"/>
+                <a:cs typeface="Times New Roman" panose="02020603050405020304" pitchFamily="18" charset="0"/>
+              </a:rPr>
+              <a:t>If the rules are not clear to you, press F to read them again. </a:t>
+            </a:r>
+          </a:p>
+          <a:p>
+            <a:pPr algn="just"/>
+            <a:endParaRPr lang="en-US" dirty="0">
+              <a:latin typeface="Times New Roman" panose="02020603050405020304" pitchFamily="18" charset="0"/>
+              <a:cs typeface="Times New Roman" panose="02020603050405020304" pitchFamily="18" charset="0"/>
+            </a:endParaRPr>
+          </a:p>
+          <a:p>
+            <a:pPr algn="just"/>
+            <a:r>
+              <a:rPr lang="en-US" dirty="0">
+                <a:latin typeface="Times New Roman" panose="02020603050405020304" pitchFamily="18" charset="0"/>
+                <a:cs typeface="Times New Roman" panose="02020603050405020304" pitchFamily="18" charset="0"/>
+              </a:rPr>
+              <a:t>If everything is clear, press J to start Block 1.</a:t>
+            </a:r>
+          </a:p>
+        </p:txBody>
+      </p:sp>
     </p:spTree>
     <p:extLst>
       <p:ext uri="{BB962C8B-B14F-4D97-AF65-F5344CB8AC3E}">
-        <p14:creationId xmlns:p14="http://schemas.microsoft.com/office/powerpoint/2010/main" val="1856778987"/>
+        <p14:creationId xmlns:p14="http://schemas.microsoft.com/office/powerpoint/2010/main" val="3015311132"/>
       </p:ext>
     </p:extLst>
   </p:cSld>
@@ -6313,6 +6541,107 @@
       </p:grpSpPr>
       <p:sp>
         <p:nvSpPr>
+          <p:cNvPr id="5" name="TextBox 4">
+            <a:extLst>
+              <a:ext uri="{FF2B5EF4-FFF2-40B4-BE49-F238E27FC236}">
+                <a16:creationId xmlns:a16="http://schemas.microsoft.com/office/drawing/2014/main" id="{F24654F7-B50D-154D-95F2-62F3930906CD}"/>
+              </a:ext>
+            </a:extLst>
+          </p:cNvPr>
+          <p:cNvSpPr txBox="1"/>
+          <p:nvPr/>
+        </p:nvSpPr>
+        <p:spPr>
+          <a:xfrm>
+            <a:off x="537426" y="1270169"/>
+            <a:ext cx="8085762" cy="1754326"/>
+          </a:xfrm>
+          <a:prstGeom prst="rect">
+            <a:avLst/>
+          </a:prstGeom>
+          <a:noFill/>
+        </p:spPr>
+        <p:txBody>
+          <a:bodyPr wrap="square" rtlCol="0">
+            <a:spAutoFit/>
+          </a:bodyPr>
+          <a:lstStyle/>
+          <a:p>
+            <a:pPr algn="just"/>
+            <a:r>
+              <a:rPr lang="en-US" dirty="0">
+                <a:latin typeface="Times New Roman" panose="02020603050405020304" pitchFamily="18" charset="0"/>
+                <a:cs typeface="Times New Roman" panose="02020603050405020304" pitchFamily="18" charset="0"/>
+              </a:rPr>
+              <a:t>Block 2 contains a different wheel of fortune game, the </a:t>
+            </a:r>
+            <a:r>
+              <a:rPr lang="en-US" b="1" dirty="0">
+                <a:latin typeface="Times New Roman" panose="02020603050405020304" pitchFamily="18" charset="0"/>
+                <a:cs typeface="Times New Roman" panose="02020603050405020304" pitchFamily="18" charset="0"/>
+              </a:rPr>
+              <a:t>choice</a:t>
+            </a:r>
+            <a:r>
+              <a:rPr lang="en-US" dirty="0">
+                <a:latin typeface="Times New Roman" panose="02020603050405020304" pitchFamily="18" charset="0"/>
+                <a:cs typeface="Times New Roman" panose="02020603050405020304" pitchFamily="18" charset="0"/>
+              </a:rPr>
+              <a:t> game.</a:t>
+            </a:r>
+          </a:p>
+          <a:p>
+            <a:pPr algn="just"/>
+            <a:endParaRPr lang="en-US" dirty="0">
+              <a:latin typeface="Times New Roman" panose="02020603050405020304" pitchFamily="18" charset="0"/>
+              <a:cs typeface="Times New Roman" panose="02020603050405020304" pitchFamily="18" charset="0"/>
+            </a:endParaRPr>
+          </a:p>
+          <a:p>
+            <a:pPr algn="just"/>
+            <a:r>
+              <a:rPr lang="en-US" dirty="0">
+                <a:latin typeface="Times New Roman" panose="02020603050405020304" pitchFamily="18" charset="0"/>
+                <a:cs typeface="Times New Roman" panose="02020603050405020304" pitchFamily="18" charset="0"/>
+              </a:rPr>
+              <a:t>At the beginning of each game, the program will tell you how many games there are in the current block, and which game you are going to play next (see below).</a:t>
+            </a:r>
+          </a:p>
+          <a:p>
+            <a:pPr algn="just"/>
+            <a:endParaRPr lang="en-US" dirty="0">
+              <a:latin typeface="Times New Roman" panose="02020603050405020304" pitchFamily="18" charset="0"/>
+              <a:cs typeface="Times New Roman" panose="02020603050405020304" pitchFamily="18" charset="0"/>
+            </a:endParaRPr>
+          </a:p>
+          <a:p>
+            <a:pPr algn="just"/>
+            <a:r>
+              <a:rPr lang="en-US" dirty="0">
+                <a:latin typeface="Times New Roman" panose="02020603050405020304" pitchFamily="18" charset="0"/>
+                <a:cs typeface="Times New Roman" panose="02020603050405020304" pitchFamily="18" charset="0"/>
+              </a:rPr>
+              <a:t>You can </a:t>
+            </a:r>
+            <a:r>
+              <a:rPr lang="en-US" b="1" dirty="0">
+                <a:latin typeface="Times New Roman" panose="02020603050405020304" pitchFamily="18" charset="0"/>
+                <a:cs typeface="Times New Roman" panose="02020603050405020304" pitchFamily="18" charset="0"/>
+              </a:rPr>
+              <a:t>press the space bar </a:t>
+            </a:r>
+            <a:r>
+              <a:rPr lang="en-US" dirty="0">
+                <a:latin typeface="Times New Roman" panose="02020603050405020304" pitchFamily="18" charset="0"/>
+                <a:cs typeface="Times New Roman" panose="02020603050405020304" pitchFamily="18" charset="0"/>
+              </a:rPr>
+              <a:t>to start a game.</a:t>
+            </a:r>
+          </a:p>
+        </p:txBody>
+      </p:sp>
+      <p:sp>
+        <p:nvSpPr>
           <p:cNvPr id="6" name="TextBox 5">
             <a:extLst>
               <a:ext uri="{FF2B5EF4-FFF2-40B4-BE49-F238E27FC236}">
@@ -6405,10 +6734,10 @@
       </p:sp>
       <p:pic>
         <p:nvPicPr>
-          <p:cNvPr id="3" name="Picture 2" descr="A picture containing chart&#10;&#10;Description automatically generated">
+          <p:cNvPr id="3" name="Picture 2">
             <a:extLst>
               <a:ext uri="{FF2B5EF4-FFF2-40B4-BE49-F238E27FC236}">
-                <a16:creationId xmlns:a16="http://schemas.microsoft.com/office/drawing/2014/main" id="{4B238CC3-24CF-F346-AAEB-0F7889A0C529}"/>
+                <a16:creationId xmlns:a16="http://schemas.microsoft.com/office/drawing/2014/main" id="{DC2BFDBC-A80C-A2FB-CC65-F93AE95369F7}"/>
               </a:ext>
             </a:extLst>
           </p:cNvPr>
@@ -6417,84 +6746,31 @@
           </p:cNvPicPr>
           <p:nvPr/>
         </p:nvPicPr>
-        <p:blipFill rotWithShape="1">
+        <p:blipFill>
           <a:blip r:embed="rId2"/>
-          <a:srcRect l="-1194" r="56377"/>
-          <a:stretch/>
+          <a:stretch>
+            <a:fillRect/>
+          </a:stretch>
         </p:blipFill>
         <p:spPr>
           <a:xfrm>
-            <a:off x="3543053" y="3608778"/>
-            <a:ext cx="1998964" cy="2257668"/>
+            <a:off x="1164091" y="3673863"/>
+            <a:ext cx="6756888" cy="1913968"/>
           </a:xfrm>
           <a:prstGeom prst="rect">
             <a:avLst/>
           </a:prstGeom>
-          <a:ln w="25400">
-            <a:noFill/>
+          <a:ln w="19050">
+            <a:solidFill>
+              <a:schemeClr val="tx1"/>
+            </a:solidFill>
           </a:ln>
         </p:spPr>
       </p:pic>
-      <p:sp>
-        <p:nvSpPr>
-          <p:cNvPr id="8" name="TextBox 7">
-            <a:extLst>
-              <a:ext uri="{FF2B5EF4-FFF2-40B4-BE49-F238E27FC236}">
-                <a16:creationId xmlns:a16="http://schemas.microsoft.com/office/drawing/2014/main" id="{269182A9-451C-C147-88F1-D3CC92B1FE7D}"/>
-              </a:ext>
-            </a:extLst>
-          </p:cNvPr>
-          <p:cNvSpPr txBox="1"/>
-          <p:nvPr/>
-        </p:nvSpPr>
-        <p:spPr>
-          <a:xfrm>
-            <a:off x="586529" y="1133638"/>
-            <a:ext cx="8085762" cy="2308324"/>
-          </a:xfrm>
-          <a:prstGeom prst="rect">
-            <a:avLst/>
-          </a:prstGeom>
-          <a:noFill/>
-        </p:spPr>
-        <p:txBody>
-          <a:bodyPr wrap="square" rtlCol="0">
-            <a:spAutoFit/>
-          </a:bodyPr>
-          <a:lstStyle/>
-          <a:p>
-            <a:pPr algn="just"/>
-            <a:r>
-              <a:rPr lang="en-US" dirty="0">
-                <a:latin typeface="Times New Roman" panose="02020603050405020304" pitchFamily="18" charset="0"/>
-                <a:cs typeface="Times New Roman" panose="02020603050405020304" pitchFamily="18" charset="0"/>
-              </a:rPr>
-              <a:t>Another option is a gamble option. This option is represented by a pie chart that contains both red and green areas (see the example below). The green area represents the probability that you will win the amount shown above the pie chart; the red area represents the probability that you will get nothing. Thus, the larger the green area, the higher the probability of winning.</a:t>
-            </a:r>
-          </a:p>
-          <a:p>
-            <a:pPr algn="just"/>
-            <a:endParaRPr lang="en-US" dirty="0">
-              <a:latin typeface="Times New Roman" panose="02020603050405020304" pitchFamily="18" charset="0"/>
-              <a:cs typeface="Times New Roman" panose="02020603050405020304" pitchFamily="18" charset="0"/>
-            </a:endParaRPr>
-          </a:p>
-          <a:p>
-            <a:pPr algn="just"/>
-            <a:r>
-              <a:rPr lang="en-US" dirty="0">
-                <a:latin typeface="Times New Roman" panose="02020603050405020304" pitchFamily="18" charset="0"/>
-                <a:cs typeface="Times New Roman" panose="02020603050405020304" pitchFamily="18" charset="0"/>
-              </a:rPr>
-              <a:t>In this example, if you pick this option, there is a 33% chance that you will win 150 points, and a 67% chance that you will get nothing (0 points).  </a:t>
-            </a:r>
-          </a:p>
-        </p:txBody>
-      </p:sp>
     </p:spTree>
     <p:extLst>
       <p:ext uri="{BB962C8B-B14F-4D97-AF65-F5344CB8AC3E}">
-        <p14:creationId xmlns:p14="http://schemas.microsoft.com/office/powerpoint/2010/main" val="2220409512"/>
+        <p14:creationId xmlns:p14="http://schemas.microsoft.com/office/powerpoint/2010/main" val="1856778987"/>
       </p:ext>
     </p:extLst>
   </p:cSld>
@@ -6535,8 +6811,8 @@
         </p:nvSpPr>
         <p:spPr>
           <a:xfrm>
-            <a:off x="586529" y="1674674"/>
-            <a:ext cx="8085762" cy="1477328"/>
+            <a:off x="537426" y="1085503"/>
+            <a:ext cx="8085762" cy="923330"/>
           </a:xfrm>
           <a:prstGeom prst="rect">
             <a:avLst/>
@@ -6555,7 +6831,24 @@
                 <a:latin typeface="Times New Roman" panose="02020603050405020304" pitchFamily="18" charset="0"/>
                 <a:cs typeface="Times New Roman" panose="02020603050405020304" pitchFamily="18" charset="0"/>
               </a:rPr>
-              <a:t>The two options will be shown side by side. Press the F key if you want to choose the left option and press the J key if you want to choose the right option. After your choice, the chosen pie chart will be turned. If the turned side is green, you win the number of points shown above the selected pie chart; if the turned side is red, you will get nothing (0 points).</a:t>
+              <a:t>After you start, you will see two wheels on screen (see an example below).</a:t>
+            </a:r>
+          </a:p>
+          <a:p>
+            <a:pPr algn="just"/>
+            <a:endParaRPr lang="en-US" dirty="0">
+              <a:latin typeface="Times New Roman" panose="02020603050405020304" pitchFamily="18" charset="0"/>
+              <a:cs typeface="Times New Roman" panose="02020603050405020304" pitchFamily="18" charset="0"/>
+            </a:endParaRPr>
+          </a:p>
+          <a:p>
+            <a:pPr algn="just"/>
+            <a:r>
+              <a:rPr lang="en-US" dirty="0">
+                <a:latin typeface="Times New Roman" panose="02020603050405020304" pitchFamily="18" charset="0"/>
+                <a:cs typeface="Times New Roman" panose="02020603050405020304" pitchFamily="18" charset="0"/>
+              </a:rPr>
+              <a:t>The two wheels will have green and gray parts and have a number on top of them.</a:t>
             </a:r>
           </a:p>
         </p:txBody>
@@ -6654,10 +6947,10 @@
       </p:sp>
       <p:pic>
         <p:nvPicPr>
-          <p:cNvPr id="3" name="Picture 2" descr="A picture containing chart&#10;&#10;Description automatically generated">
+          <p:cNvPr id="3" name="Picture 2">
             <a:extLst>
               <a:ext uri="{FF2B5EF4-FFF2-40B4-BE49-F238E27FC236}">
-                <a16:creationId xmlns:a16="http://schemas.microsoft.com/office/drawing/2014/main" id="{4B238CC3-24CF-F346-AAEB-0F7889A0C529}"/>
+                <a16:creationId xmlns:a16="http://schemas.microsoft.com/office/drawing/2014/main" id="{D4312F05-E762-F8E6-D5C4-95C1B2B4B2BE}"/>
               </a:ext>
             </a:extLst>
           </p:cNvPr>
@@ -6666,28 +6959,31 @@
           </p:cNvPicPr>
           <p:nvPr/>
         </p:nvPicPr>
-        <p:blipFill rotWithShape="1">
+        <p:blipFill>
           <a:blip r:embed="rId2"/>
-          <a:srcRect l="128" t="-259" r="383" b="-400"/>
-          <a:stretch/>
+          <a:stretch>
+            <a:fillRect/>
+          </a:stretch>
         </p:blipFill>
         <p:spPr>
           <a:xfrm>
-            <a:off x="2361542" y="3601335"/>
-            <a:ext cx="4437529" cy="2272553"/>
+            <a:off x="1977737" y="2696216"/>
+            <a:ext cx="5188525" cy="3184862"/>
           </a:xfrm>
           <a:prstGeom prst="rect">
             <a:avLst/>
           </a:prstGeom>
-          <a:ln w="25400">
-            <a:noFill/>
+          <a:ln w="19050">
+            <a:solidFill>
+              <a:schemeClr val="tx1"/>
+            </a:solidFill>
           </a:ln>
         </p:spPr>
       </p:pic>
     </p:spTree>
     <p:extLst>
       <p:ext uri="{BB962C8B-B14F-4D97-AF65-F5344CB8AC3E}">
-        <p14:creationId xmlns:p14="http://schemas.microsoft.com/office/powerpoint/2010/main" val="2170332892"/>
+        <p14:creationId xmlns:p14="http://schemas.microsoft.com/office/powerpoint/2010/main" val="3451755930"/>
       </p:ext>
     </p:extLst>
   </p:cSld>

</xml_diff>